<commit_message>
Update pptx file with SDs
</commit_message>
<xml_diff>
--- a/docs/diagrams/Diagrams.pptx
+++ b/docs/diagrams/Diagrams.pptx
@@ -7043,6 +7043,43 @@
           </a:effectRef>
           <a:fontRef idx="minor">
             <a:schemeClr val="tx1"/>
+          </a:fontRef>
+        </p:style>
+      </p:cxnSp>
+      <p:cxnSp>
+        <p:nvCxnSpPr>
+          <p:cNvPr id="85" name="Straight Connector 84"/>
+          <p:cNvCxnSpPr/>
+          <p:nvPr/>
+        </p:nvCxnSpPr>
+        <p:spPr>
+          <a:xfrm flipH="1">
+            <a:off x="945964" y="2262670"/>
+            <a:ext cx="24" cy="1598671"/>
+          </a:xfrm>
+          <a:prstGeom prst="line">
+            <a:avLst/>
+          </a:prstGeom>
+          <a:ln w="19050">
+            <a:solidFill>
+              <a:schemeClr val="tx1"/>
+            </a:solidFill>
+            <a:prstDash val="sysDash"/>
+          </a:ln>
+          <a:effectLst/>
+        </p:spPr>
+        <p:style>
+          <a:lnRef idx="1">
+            <a:schemeClr val="accent1"/>
+          </a:lnRef>
+          <a:fillRef idx="2">
+            <a:schemeClr val="accent1"/>
+          </a:fillRef>
+          <a:effectRef idx="1">
+            <a:schemeClr val="accent1"/>
+          </a:effectRef>
+          <a:fontRef idx="minor">
+            <a:schemeClr val="dk1"/>
           </a:fontRef>
         </p:style>
       </p:cxnSp>

</xml_diff>

<commit_message>
Move AddressBook change event handling to Storage
</commit_message>
<xml_diff>
--- a/docs/diagrams/Diagrams.pptx
+++ b/docs/diagrams/Diagrams.pptx
@@ -4898,7 +4898,7 @@
         </p:nvSpPr>
         <p:spPr>
           <a:xfrm>
-            <a:off x="1743430" y="1770924"/>
+            <a:off x="1111860" y="1770924"/>
             <a:ext cx="1093635" cy="346760"/>
           </a:xfrm>
           <a:prstGeom prst="rect">
@@ -4957,7 +4957,7 @@
         </p:nvCxnSpPr>
         <p:spPr>
           <a:xfrm>
-            <a:off x="2290247" y="2134595"/>
+            <a:off x="1658677" y="2134595"/>
             <a:ext cx="0" cy="1723059"/>
           </a:xfrm>
           <a:prstGeom prst="line">
@@ -4994,7 +4994,7 @@
         </p:nvSpPr>
         <p:spPr>
           <a:xfrm>
-            <a:off x="2218239" y="2485290"/>
+            <a:off x="1586669" y="2485290"/>
             <a:ext cx="152400" cy="1019910"/>
           </a:xfrm>
           <a:prstGeom prst="rect">
@@ -5045,7 +5045,7 @@
         </p:nvGrpSpPr>
         <p:grpSpPr>
           <a:xfrm>
-            <a:off x="783970" y="1696398"/>
+            <a:off x="152400" y="1696398"/>
             <a:ext cx="324036" cy="573410"/>
             <a:chOff x="3239901" y="4149080"/>
             <a:chExt cx="648072" cy="1146820"/>
@@ -5262,7 +5262,7 @@
         </p:nvSpPr>
         <p:spPr>
           <a:xfrm>
-            <a:off x="3967153" y="1774611"/>
+            <a:off x="3335583" y="1774611"/>
             <a:ext cx="1093635" cy="346760"/>
           </a:xfrm>
           <a:prstGeom prst="rect">
@@ -5321,7 +5321,7 @@
         </p:nvCxnSpPr>
         <p:spPr>
           <a:xfrm>
-            <a:off x="4513970" y="2138282"/>
+            <a:off x="3882400" y="2138282"/>
             <a:ext cx="0" cy="1723059"/>
           </a:xfrm>
           <a:prstGeom prst="line">
@@ -5358,7 +5358,7 @@
         </p:nvSpPr>
         <p:spPr>
           <a:xfrm>
-            <a:off x="4441962" y="2596475"/>
+            <a:off x="3810392" y="2596475"/>
             <a:ext cx="144016" cy="832525"/>
           </a:xfrm>
           <a:prstGeom prst="rect">
@@ -5409,7 +5409,7 @@
         </p:nvSpPr>
         <p:spPr>
           <a:xfrm>
-            <a:off x="5948353" y="1770924"/>
+            <a:off x="5316783" y="1770924"/>
             <a:ext cx="1093635" cy="346760"/>
           </a:xfrm>
           <a:prstGeom prst="rect">
@@ -5468,7 +5468,7 @@
         </p:nvCxnSpPr>
         <p:spPr>
           <a:xfrm>
-            <a:off x="6495170" y="2134595"/>
+            <a:off x="5863600" y="2134595"/>
             <a:ext cx="0" cy="1723059"/>
           </a:xfrm>
           <a:prstGeom prst="line">
@@ -5505,7 +5505,7 @@
         </p:nvSpPr>
         <p:spPr>
           <a:xfrm>
-            <a:off x="6423162" y="2701406"/>
+            <a:off x="5791592" y="2701406"/>
             <a:ext cx="142006" cy="651394"/>
           </a:xfrm>
           <a:prstGeom prst="rect">
@@ -5556,7 +5556,7 @@
         </p:nvCxnSpPr>
         <p:spPr>
           <a:xfrm>
-            <a:off x="1098388" y="2488977"/>
+            <a:off x="466818" y="2488977"/>
             <a:ext cx="1119851" cy="0"/>
           </a:xfrm>
           <a:prstGeom prst="straightConnector1">
@@ -5592,7 +5592,7 @@
         </p:nvSpPr>
         <p:spPr>
           <a:xfrm>
-            <a:off x="1098388" y="2508878"/>
+            <a:off x="466818" y="2508878"/>
             <a:ext cx="860170" cy="215444"/>
           </a:xfrm>
           <a:prstGeom prst="rect">
@@ -5622,7 +5622,7 @@
         </p:nvCxnSpPr>
         <p:spPr>
           <a:xfrm>
-            <a:off x="2370639" y="2596476"/>
+            <a:off x="1739069" y="2596476"/>
             <a:ext cx="2071323" cy="0"/>
           </a:xfrm>
           <a:prstGeom prst="straightConnector1">
@@ -5658,7 +5658,7 @@
         </p:nvSpPr>
         <p:spPr>
           <a:xfrm>
-            <a:off x="2797742" y="2616377"/>
+            <a:off x="2166172" y="2616377"/>
             <a:ext cx="1424846" cy="215444"/>
           </a:xfrm>
           <a:prstGeom prst="rect">
@@ -5696,7 +5696,7 @@
         </p:nvCxnSpPr>
         <p:spPr>
           <a:xfrm>
-            <a:off x="4585978" y="2701407"/>
+            <a:off x="3954408" y="2701407"/>
             <a:ext cx="1837184" cy="0"/>
           </a:xfrm>
           <a:prstGeom prst="straightConnector1">
@@ -5732,7 +5732,7 @@
         </p:nvSpPr>
         <p:spPr>
           <a:xfrm>
-            <a:off x="4931342" y="2705581"/>
+            <a:off x="4299772" y="2705581"/>
             <a:ext cx="1424846" cy="215444"/>
           </a:xfrm>
           <a:prstGeom prst="rect">
@@ -5778,8 +5778,8 @@
         </p:nvSpPr>
         <p:spPr>
           <a:xfrm>
-            <a:off x="6705600" y="2850654"/>
-            <a:ext cx="2057400" cy="215444"/>
+            <a:off x="6074030" y="2850654"/>
+            <a:ext cx="2438400" cy="215444"/>
           </a:xfrm>
           <a:prstGeom prst="rect">
             <a:avLst/>
@@ -5810,7 +5810,7 @@
                   </a:schemeClr>
                 </a:solidFill>
               </a:rPr>
-              <a:t>ModelChangedEvent</a:t>
+              <a:t>AddressBookChangedEvent</a:t>
             </a:r>
             <a:r>
               <a:rPr lang="en-US" sz="1400" dirty="0" smtClean="0">
@@ -5840,7 +5840,7 @@
         </p:nvCxnSpPr>
         <p:spPr>
           <a:xfrm>
-            <a:off x="4585978" y="3353679"/>
+            <a:off x="3954408" y="3353679"/>
             <a:ext cx="1837184" cy="0"/>
           </a:xfrm>
           <a:prstGeom prst="straightConnector1">
@@ -5878,7 +5878,7 @@
         </p:nvCxnSpPr>
         <p:spPr>
           <a:xfrm>
-            <a:off x="2370639" y="3429000"/>
+            <a:off x="1739069" y="3429000"/>
             <a:ext cx="2058118" cy="0"/>
           </a:xfrm>
           <a:prstGeom prst="straightConnector1">
@@ -5916,7 +5916,7 @@
         </p:nvCxnSpPr>
         <p:spPr>
           <a:xfrm>
-            <a:off x="1022188" y="3505200"/>
+            <a:off x="390618" y="3505200"/>
             <a:ext cx="1196051" cy="0"/>
           </a:xfrm>
           <a:prstGeom prst="straightConnector1">
@@ -5954,7 +5954,7 @@
         </p:nvSpPr>
         <p:spPr>
           <a:xfrm>
-            <a:off x="7620000" y="1754249"/>
+            <a:off x="7696200" y="1754249"/>
             <a:ext cx="1371600" cy="346760"/>
           </a:xfrm>
           <a:prstGeom prst="rect">
@@ -6025,7 +6025,7 @@
         </p:nvCxnSpPr>
         <p:spPr>
           <a:xfrm>
-            <a:off x="8693002" y="2107303"/>
+            <a:off x="8616802" y="2107303"/>
             <a:ext cx="0" cy="1723059"/>
           </a:xfrm>
           <a:prstGeom prst="line">
@@ -6064,7 +6064,7 @@
         </p:nvSpPr>
         <p:spPr>
           <a:xfrm>
-            <a:off x="8620994" y="3124200"/>
+            <a:off x="8544794" y="3124200"/>
             <a:ext cx="142006" cy="176787"/>
           </a:xfrm>
           <a:prstGeom prst="rect">
@@ -6119,8 +6119,8 @@
         </p:nvCxnSpPr>
         <p:spPr>
           <a:xfrm>
-            <a:off x="6575562" y="3124200"/>
-            <a:ext cx="2035038" cy="0"/>
+            <a:off x="5943992" y="3124200"/>
+            <a:ext cx="2568438" cy="0"/>
           </a:xfrm>
           <a:prstGeom prst="straightConnector1">
             <a:avLst/>
@@ -6155,8 +6155,8 @@
         </p:nvCxnSpPr>
         <p:spPr>
           <a:xfrm>
-            <a:off x="6575562" y="3300987"/>
-            <a:ext cx="2035038" cy="0"/>
+            <a:off x="5943992" y="3300987"/>
+            <a:ext cx="2549946" cy="0"/>
           </a:xfrm>
           <a:prstGeom prst="straightConnector1">
             <a:avLst/>
@@ -6189,24 +6189,28 @@
       </p:cxnSp>
       <p:sp>
         <p:nvSpPr>
-          <p:cNvPr id="50" name="Rectangle 62"/>
+          <p:cNvPr id="53" name="Rectangle 62"/>
           <p:cNvSpPr/>
           <p:nvPr/>
         </p:nvSpPr>
         <p:spPr>
           <a:xfrm>
-            <a:off x="4576753" y="4394721"/>
+            <a:off x="7370178" y="4278322"/>
             <a:ext cx="1093635" cy="346760"/>
           </a:xfrm>
           <a:prstGeom prst="rect">
             <a:avLst/>
           </a:prstGeom>
           <a:solidFill>
-            <a:srgbClr val="0070C0"/>
+            <a:schemeClr val="accent6">
+              <a:lumMod val="75000"/>
+            </a:schemeClr>
           </a:solidFill>
           <a:ln w="19050">
             <a:solidFill>
-              <a:srgbClr val="0070C0"/>
+              <a:schemeClr val="accent6">
+                <a:lumMod val="75000"/>
+              </a:schemeClr>
             </a:solidFill>
           </a:ln>
           <a:effectLst/>
@@ -6236,7 +6240,7 @@
                   <a:schemeClr val="bg1"/>
                 </a:solidFill>
               </a:rPr>
-              <a:t>:Logic</a:t>
+              <a:t>:Storage</a:t>
             </a:r>
             <a:endParaRPr lang="en-SG" sz="1600" dirty="0">
               <a:solidFill>
@@ -6248,13 +6252,13 @@
       </p:sp>
       <p:cxnSp>
         <p:nvCxnSpPr>
-          <p:cNvPr id="51" name="Straight Connector 50"/>
+          <p:cNvPr id="54" name="Straight Connector 53"/>
           <p:cNvCxnSpPr/>
           <p:nvPr/>
         </p:nvCxnSpPr>
         <p:spPr>
           <a:xfrm>
-            <a:off x="5123570" y="4758392"/>
+            <a:off x="7916995" y="4641993"/>
             <a:ext cx="0" cy="1723059"/>
           </a:xfrm>
           <a:prstGeom prst="line">
@@ -6262,7 +6266,9 @@
           </a:prstGeom>
           <a:ln w="19050">
             <a:solidFill>
-              <a:srgbClr val="0070C0"/>
+              <a:schemeClr val="accent6">
+                <a:lumMod val="75000"/>
+              </a:schemeClr>
             </a:solidFill>
             <a:prstDash val="sysDash"/>
           </a:ln>
@@ -6285,24 +6291,28 @@
       </p:cxnSp>
       <p:sp>
         <p:nvSpPr>
-          <p:cNvPr id="52" name="Rectangle 51"/>
+          <p:cNvPr id="55" name="Rectangle 54"/>
           <p:cNvSpPr/>
           <p:nvPr/>
         </p:nvSpPr>
         <p:spPr>
           <a:xfrm>
-            <a:off x="5051562" y="5444618"/>
-            <a:ext cx="144016" cy="377574"/>
+            <a:off x="7844987" y="5335662"/>
+            <a:ext cx="131366" cy="324353"/>
           </a:xfrm>
           <a:prstGeom prst="rect">
             <a:avLst/>
           </a:prstGeom>
           <a:solidFill>
-            <a:srgbClr val="0070C0"/>
+            <a:schemeClr val="accent6">
+              <a:lumMod val="75000"/>
+            </a:schemeClr>
           </a:solidFill>
           <a:ln>
             <a:solidFill>
-              <a:srgbClr val="0070C0"/>
+              <a:schemeClr val="accent6">
+                <a:lumMod val="75000"/>
+              </a:schemeClr>
             </a:solidFill>
           </a:ln>
           <a:effectLst/>
@@ -6336,26 +6346,130 @@
       </p:sp>
       <p:sp>
         <p:nvSpPr>
-          <p:cNvPr id="53" name="Rectangle 62"/>
+          <p:cNvPr id="62" name="TextBox 61"/>
+          <p:cNvSpPr txBox="1"/>
+          <p:nvPr/>
+        </p:nvSpPr>
+        <p:spPr>
+          <a:xfrm>
+            <a:off x="1810094" y="4797674"/>
+            <a:ext cx="2716635" cy="215444"/>
+          </a:xfrm>
+          <a:prstGeom prst="rect">
+            <a:avLst/>
+          </a:prstGeom>
+          <a:noFill/>
+        </p:spPr>
+        <p:txBody>
+          <a:bodyPr wrap="square" lIns="0" tIns="0" rIns="0" bIns="0" rtlCol="0">
+            <a:spAutoFit/>
+          </a:bodyPr>
+          <a:lstStyle/>
+          <a:p>
+            <a:r>
+              <a:rPr lang="en-US" sz="1400" dirty="0" smtClean="0">
+                <a:solidFill>
+                  <a:schemeClr val="accent5">
+                    <a:lumMod val="75000"/>
+                  </a:schemeClr>
+                </a:solidFill>
+              </a:rPr>
+              <a:t>post(</a:t>
+            </a:r>
+            <a:r>
+              <a:rPr lang="en-US" sz="1400" dirty="0" err="1" smtClean="0">
+                <a:solidFill>
+                  <a:schemeClr val="accent5">
+                    <a:lumMod val="75000"/>
+                  </a:schemeClr>
+                </a:solidFill>
+              </a:rPr>
+              <a:t>AddressBookChangedEvent</a:t>
+            </a:r>
+            <a:r>
+              <a:rPr lang="en-US" sz="1400" dirty="0" smtClean="0">
+                <a:solidFill>
+                  <a:schemeClr val="accent5">
+                    <a:lumMod val="75000"/>
+                  </a:schemeClr>
+                </a:solidFill>
+              </a:rPr>
+              <a:t>)</a:t>
+            </a:r>
+            <a:endParaRPr lang="en-US" sz="1400" dirty="0">
+              <a:solidFill>
+                <a:schemeClr val="accent5">
+                  <a:lumMod val="75000"/>
+                </a:schemeClr>
+              </a:solidFill>
+            </a:endParaRPr>
+          </a:p>
+        </p:txBody>
+      </p:sp>
+      <p:cxnSp>
+        <p:nvCxnSpPr>
+          <p:cNvPr id="63" name="Straight Arrow Connector 62"/>
+          <p:cNvCxnSpPr>
+            <a:stCxn id="55" idx="2"/>
+          </p:cNvCxnSpPr>
+          <p:nvPr/>
+        </p:nvCxnSpPr>
+        <p:spPr>
+          <a:xfrm flipH="1">
+            <a:off x="4526729" y="5660015"/>
+            <a:ext cx="3383941" cy="0"/>
+          </a:xfrm>
+          <a:prstGeom prst="straightConnector1">
+            <a:avLst/>
+          </a:prstGeom>
+          <a:ln w="19050">
+            <a:solidFill>
+              <a:schemeClr val="accent6">
+                <a:lumMod val="75000"/>
+              </a:schemeClr>
+            </a:solidFill>
+            <a:prstDash val="sysDash"/>
+            <a:headEnd type="none" w="med" len="med"/>
+            <a:tailEnd type="arrow" w="med" len="med"/>
+          </a:ln>
+        </p:spPr>
+        <p:style>
+          <a:lnRef idx="1">
+            <a:schemeClr val="accent1"/>
+          </a:lnRef>
+          <a:fillRef idx="0">
+            <a:schemeClr val="accent1"/>
+          </a:fillRef>
+          <a:effectRef idx="0">
+            <a:schemeClr val="accent1"/>
+          </a:effectRef>
+          <a:fontRef idx="minor">
+            <a:schemeClr val="tx1"/>
+          </a:fontRef>
+        </p:style>
+      </p:cxnSp>
+      <p:sp>
+        <p:nvSpPr>
+          <p:cNvPr id="66" name="Rectangle 62"/>
           <p:cNvSpPr/>
           <p:nvPr/>
         </p:nvSpPr>
         <p:spPr>
           <a:xfrm>
-            <a:off x="2793523" y="4422026"/>
-            <a:ext cx="1093635" cy="346760"/>
+            <a:off x="3791146" y="4295233"/>
+            <a:ext cx="1371600" cy="346760"/>
           </a:xfrm>
           <a:prstGeom prst="rect">
             <a:avLst/>
           </a:prstGeom>
           <a:solidFill>
-            <a:schemeClr val="accent6">
+            <a:schemeClr val="accent5">
               <a:lumMod val="75000"/>
             </a:schemeClr>
           </a:solidFill>
           <a:ln w="19050">
             <a:solidFill>
-              <a:schemeClr val="accent6">
+              <a:schemeClr val="accent5">
                 <a:lumMod val="75000"/>
               </a:schemeClr>
             </a:solidFill>
@@ -6387,7 +6501,15 @@
                   <a:schemeClr val="bg1"/>
                 </a:solidFill>
               </a:rPr>
-              <a:t>:Storage</a:t>
+              <a:t>:</a:t>
+            </a:r>
+            <a:r>
+              <a:rPr lang="en-US" sz="1600" dirty="0" err="1" smtClean="0">
+                <a:solidFill>
+                  <a:schemeClr val="bg1"/>
+                </a:solidFill>
+              </a:rPr>
+              <a:t>EventsCenter</a:t>
             </a:r>
             <a:endParaRPr lang="en-SG" sz="1600" dirty="0">
               <a:solidFill>
@@ -6399,13 +6521,13 @@
       </p:sp>
       <p:cxnSp>
         <p:nvCxnSpPr>
-          <p:cNvPr id="54" name="Straight Connector 53"/>
+          <p:cNvPr id="67" name="Straight Connector 66"/>
           <p:cNvCxnSpPr/>
           <p:nvPr/>
         </p:nvCxnSpPr>
         <p:spPr>
           <a:xfrm>
-            <a:off x="3340340" y="4785697"/>
+            <a:off x="4456731" y="4648287"/>
             <a:ext cx="0" cy="1723059"/>
           </a:xfrm>
           <a:prstGeom prst="line">
@@ -6413,7 +6535,7 @@
           </a:prstGeom>
           <a:ln w="19050">
             <a:solidFill>
-              <a:schemeClr val="accent6">
+              <a:schemeClr val="accent5">
                 <a:lumMod val="75000"/>
               </a:schemeClr>
             </a:solidFill>
@@ -6438,26 +6560,26 @@
       </p:cxnSp>
       <p:sp>
         <p:nvSpPr>
-          <p:cNvPr id="55" name="Rectangle 54"/>
+          <p:cNvPr id="68" name="Rectangle 67"/>
           <p:cNvSpPr/>
           <p:nvPr/>
         </p:nvSpPr>
         <p:spPr>
           <a:xfrm>
-            <a:off x="3268332" y="5479366"/>
-            <a:ext cx="131366" cy="324353"/>
+            <a:off x="4384723" y="5071220"/>
+            <a:ext cx="142006" cy="1036757"/>
           </a:xfrm>
           <a:prstGeom prst="rect">
             <a:avLst/>
           </a:prstGeom>
           <a:solidFill>
-            <a:schemeClr val="accent6">
+            <a:schemeClr val="accent5">
               <a:lumMod val="75000"/>
             </a:schemeClr>
           </a:solidFill>
           <a:ln>
             <a:solidFill>
-              <a:schemeClr val="accent6">
+              <a:schemeClr val="accent5">
                 <a:lumMod val="75000"/>
               </a:schemeClr>
             </a:solidFill>
@@ -6493,22 +6615,61 @@
       </p:sp>
       <p:cxnSp>
         <p:nvCxnSpPr>
-          <p:cNvPr id="60" name="Straight Arrow Connector 59"/>
+          <p:cNvPr id="69" name="Straight Arrow Connector 68"/>
           <p:cNvCxnSpPr/>
           <p:nvPr/>
         </p:nvCxnSpPr>
         <p:spPr>
           <a:xfrm>
-            <a:off x="3410338" y="5472908"/>
-            <a:ext cx="1627246" cy="0"/>
+            <a:off x="3078929" y="5071220"/>
+            <a:ext cx="1295400" cy="0"/>
           </a:xfrm>
           <a:prstGeom prst="straightConnector1">
             <a:avLst/>
           </a:prstGeom>
           <a:ln w="19050">
             <a:solidFill>
-              <a:srgbClr val="0070C0"/>
-            </a:solidFill>
+              <a:srgbClr val="7030A0"/>
+            </a:solidFill>
+            <a:tailEnd type="arrow"/>
+          </a:ln>
+        </p:spPr>
+        <p:style>
+          <a:lnRef idx="1">
+            <a:schemeClr val="accent1"/>
+          </a:lnRef>
+          <a:fillRef idx="0">
+            <a:schemeClr val="accent1"/>
+          </a:fillRef>
+          <a:effectRef idx="0">
+            <a:schemeClr val="accent1"/>
+          </a:effectRef>
+          <a:fontRef idx="minor">
+            <a:schemeClr val="tx1"/>
+          </a:fontRef>
+        </p:style>
+      </p:cxnSp>
+      <p:cxnSp>
+        <p:nvCxnSpPr>
+          <p:cNvPr id="70" name="Straight Arrow Connector 69"/>
+          <p:cNvCxnSpPr/>
+          <p:nvPr/>
+        </p:nvCxnSpPr>
+        <p:spPr>
+          <a:xfrm>
+            <a:off x="2975642" y="6107977"/>
+            <a:ext cx="1448755" cy="0"/>
+          </a:xfrm>
+          <a:prstGeom prst="straightConnector1">
+            <a:avLst/>
+          </a:prstGeom>
+          <a:ln w="19050">
+            <a:solidFill>
+              <a:schemeClr val="accent5">
+                <a:lumMod val="75000"/>
+              </a:schemeClr>
+            </a:solidFill>
+            <a:prstDash val="sysDash"/>
             <a:headEnd type="arrow" w="med" len="med"/>
             <a:tailEnd type="none" w="med" len="med"/>
           </a:ln>
@@ -6528,16 +6689,55 @@
           </a:fontRef>
         </p:style>
       </p:cxnSp>
-      <p:sp>
-        <p:nvSpPr>
-          <p:cNvPr id="61" name="TextBox 60"/>
+      <p:cxnSp>
+        <p:nvCxnSpPr>
+          <p:cNvPr id="72" name="Straight Arrow Connector 71"/>
+          <p:cNvCxnSpPr/>
+          <p:nvPr/>
+        </p:nvCxnSpPr>
+        <p:spPr>
+          <a:xfrm>
+            <a:off x="4526729" y="5341014"/>
+            <a:ext cx="3318258" cy="0"/>
+          </a:xfrm>
+          <a:prstGeom prst="straightConnector1">
+            <a:avLst/>
+          </a:prstGeom>
+          <a:ln w="19050">
+            <a:solidFill>
+              <a:schemeClr val="accent5">
+                <a:lumMod val="75000"/>
+              </a:schemeClr>
+            </a:solidFill>
+            <a:headEnd type="none" w="med" len="med"/>
+            <a:tailEnd type="arrow" w="med" len="med"/>
+          </a:ln>
+        </p:spPr>
+        <p:style>
+          <a:lnRef idx="1">
+            <a:schemeClr val="accent1"/>
+          </a:lnRef>
+          <a:fillRef idx="0">
+            <a:schemeClr val="accent1"/>
+          </a:fillRef>
+          <a:effectRef idx="0">
+            <a:schemeClr val="accent1"/>
+          </a:effectRef>
+          <a:fontRef idx="minor">
+            <a:schemeClr val="tx1"/>
+          </a:fontRef>
+        </p:style>
+      </p:cxnSp>
+      <p:sp>
+        <p:nvSpPr>
+          <p:cNvPr id="74" name="TextBox 73"/>
           <p:cNvSpPr txBox="1"/>
           <p:nvPr/>
         </p:nvSpPr>
         <p:spPr>
           <a:xfrm>
-            <a:off x="3505200" y="5181600"/>
-            <a:ext cx="1424846" cy="215444"/>
+            <a:off x="5036330" y="5065911"/>
+            <a:ext cx="2659870" cy="215444"/>
           </a:xfrm>
           <a:prstGeom prst="rect">
             <a:avLst/>
@@ -6558,7 +6758,7 @@
                   </a:schemeClr>
                 </a:solidFill>
               </a:rPr>
-              <a:t>saveAddressBook</a:t>
+              <a:t>handleAddresssBookChangedEvent</a:t>
             </a:r>
             <a:r>
               <a:rPr lang="en-US" sz="1400" dirty="0" smtClean="0">
@@ -6580,472 +6780,6 @@
           </a:p>
         </p:txBody>
       </p:sp>
-      <p:sp>
-        <p:nvSpPr>
-          <p:cNvPr id="62" name="TextBox 61"/>
-          <p:cNvSpPr txBox="1"/>
-          <p:nvPr/>
-        </p:nvSpPr>
-        <p:spPr>
-          <a:xfrm>
-            <a:off x="6655532" y="4785697"/>
-            <a:ext cx="2057400" cy="215444"/>
-          </a:xfrm>
-          <a:prstGeom prst="rect">
-            <a:avLst/>
-          </a:prstGeom>
-          <a:noFill/>
-        </p:spPr>
-        <p:txBody>
-          <a:bodyPr wrap="square" lIns="0" tIns="0" rIns="0" bIns="0" rtlCol="0">
-            <a:spAutoFit/>
-          </a:bodyPr>
-          <a:lstStyle/>
-          <a:p>
-            <a:r>
-              <a:rPr lang="en-US" sz="1400" dirty="0" smtClean="0">
-                <a:solidFill>
-                  <a:schemeClr val="accent5">
-                    <a:lumMod val="75000"/>
-                  </a:schemeClr>
-                </a:solidFill>
-              </a:rPr>
-              <a:t>post(</a:t>
-            </a:r>
-            <a:r>
-              <a:rPr lang="en-US" sz="1400" dirty="0" err="1" smtClean="0">
-                <a:solidFill>
-                  <a:schemeClr val="accent5">
-                    <a:lumMod val="75000"/>
-                  </a:schemeClr>
-                </a:solidFill>
-              </a:rPr>
-              <a:t>ModelChangedEvent</a:t>
-            </a:r>
-            <a:r>
-              <a:rPr lang="en-US" sz="1400" dirty="0" smtClean="0">
-                <a:solidFill>
-                  <a:schemeClr val="accent5">
-                    <a:lumMod val="75000"/>
-                  </a:schemeClr>
-                </a:solidFill>
-              </a:rPr>
-              <a:t>)</a:t>
-            </a:r>
-            <a:endParaRPr lang="en-US" sz="1400" dirty="0">
-              <a:solidFill>
-                <a:schemeClr val="accent5">
-                  <a:lumMod val="75000"/>
-                </a:schemeClr>
-              </a:solidFill>
-            </a:endParaRPr>
-          </a:p>
-        </p:txBody>
-      </p:sp>
-      <p:cxnSp>
-        <p:nvCxnSpPr>
-          <p:cNvPr id="63" name="Straight Arrow Connector 62"/>
-          <p:cNvCxnSpPr/>
-          <p:nvPr/>
-        </p:nvCxnSpPr>
-        <p:spPr>
-          <a:xfrm>
-            <a:off x="3410338" y="5791200"/>
-            <a:ext cx="1667499" cy="0"/>
-          </a:xfrm>
-          <a:prstGeom prst="straightConnector1">
-            <a:avLst/>
-          </a:prstGeom>
-          <a:ln w="19050">
-            <a:solidFill>
-              <a:schemeClr val="accent6">
-                <a:lumMod val="75000"/>
-              </a:schemeClr>
-            </a:solidFill>
-            <a:prstDash val="sysDash"/>
-            <a:headEnd type="none" w="med" len="med"/>
-            <a:tailEnd type="arrow" w="med" len="med"/>
-          </a:ln>
-        </p:spPr>
-        <p:style>
-          <a:lnRef idx="1">
-            <a:schemeClr val="accent1"/>
-          </a:lnRef>
-          <a:fillRef idx="0">
-            <a:schemeClr val="accent1"/>
-          </a:fillRef>
-          <a:effectRef idx="0">
-            <a:schemeClr val="accent1"/>
-          </a:effectRef>
-          <a:fontRef idx="minor">
-            <a:schemeClr val="tx1"/>
-          </a:fontRef>
-        </p:style>
-      </p:cxnSp>
-      <p:sp>
-        <p:nvSpPr>
-          <p:cNvPr id="66" name="Rectangle 62"/>
-          <p:cNvSpPr/>
-          <p:nvPr/>
-        </p:nvSpPr>
-        <p:spPr>
-          <a:xfrm>
-            <a:off x="7593081" y="4283256"/>
-            <a:ext cx="1371600" cy="346760"/>
-          </a:xfrm>
-          <a:prstGeom prst="rect">
-            <a:avLst/>
-          </a:prstGeom>
-          <a:solidFill>
-            <a:schemeClr val="accent5">
-              <a:lumMod val="75000"/>
-            </a:schemeClr>
-          </a:solidFill>
-          <a:ln w="19050">
-            <a:solidFill>
-              <a:schemeClr val="accent5">
-                <a:lumMod val="75000"/>
-              </a:schemeClr>
-            </a:solidFill>
-          </a:ln>
-          <a:effectLst/>
-        </p:spPr>
-        <p:style>
-          <a:lnRef idx="1">
-            <a:schemeClr val="accent2"/>
-          </a:lnRef>
-          <a:fillRef idx="2">
-            <a:schemeClr val="accent2"/>
-          </a:fillRef>
-          <a:effectRef idx="1">
-            <a:schemeClr val="accent2"/>
-          </a:effectRef>
-          <a:fontRef idx="minor">
-            <a:schemeClr val="dk1"/>
-          </a:fontRef>
-        </p:style>
-        <p:txBody>
-          <a:bodyPr rtlCol="0" anchor="ctr"/>
-          <a:lstStyle/>
-          <a:p>
-            <a:pPr algn="ctr"/>
-            <a:r>
-              <a:rPr lang="en-US" sz="1600" dirty="0" smtClean="0">
-                <a:solidFill>
-                  <a:schemeClr val="bg1"/>
-                </a:solidFill>
-              </a:rPr>
-              <a:t>:</a:t>
-            </a:r>
-            <a:r>
-              <a:rPr lang="en-US" sz="1600" dirty="0" err="1" smtClean="0">
-                <a:solidFill>
-                  <a:schemeClr val="bg1"/>
-                </a:solidFill>
-              </a:rPr>
-              <a:t>EventsCenter</a:t>
-            </a:r>
-            <a:endParaRPr lang="en-SG" sz="1600" dirty="0">
-              <a:solidFill>
-                <a:schemeClr val="bg1"/>
-              </a:solidFill>
-            </a:endParaRPr>
-          </a:p>
-        </p:txBody>
-      </p:sp>
-      <p:cxnSp>
-        <p:nvCxnSpPr>
-          <p:cNvPr id="67" name="Straight Connector 66"/>
-          <p:cNvCxnSpPr/>
-          <p:nvPr/>
-        </p:nvCxnSpPr>
-        <p:spPr>
-          <a:xfrm>
-            <a:off x="8642934" y="4636310"/>
-            <a:ext cx="0" cy="1723059"/>
-          </a:xfrm>
-          <a:prstGeom prst="line">
-            <a:avLst/>
-          </a:prstGeom>
-          <a:ln w="19050">
-            <a:solidFill>
-              <a:schemeClr val="accent5">
-                <a:lumMod val="75000"/>
-              </a:schemeClr>
-            </a:solidFill>
-            <a:prstDash val="sysDash"/>
-          </a:ln>
-          <a:effectLst/>
-        </p:spPr>
-        <p:style>
-          <a:lnRef idx="1">
-            <a:schemeClr val="accent1"/>
-          </a:lnRef>
-          <a:fillRef idx="2">
-            <a:schemeClr val="accent1"/>
-          </a:fillRef>
-          <a:effectRef idx="1">
-            <a:schemeClr val="accent1"/>
-          </a:effectRef>
-          <a:fontRef idx="minor">
-            <a:schemeClr val="dk1"/>
-          </a:fontRef>
-        </p:style>
-      </p:cxnSp>
-      <p:sp>
-        <p:nvSpPr>
-          <p:cNvPr id="68" name="Rectangle 67"/>
-          <p:cNvSpPr/>
-          <p:nvPr/>
-        </p:nvSpPr>
-        <p:spPr>
-          <a:xfrm>
-            <a:off x="8570926" y="5059243"/>
-            <a:ext cx="142006" cy="1036757"/>
-          </a:xfrm>
-          <a:prstGeom prst="rect">
-            <a:avLst/>
-          </a:prstGeom>
-          <a:solidFill>
-            <a:schemeClr val="accent5">
-              <a:lumMod val="75000"/>
-            </a:schemeClr>
-          </a:solidFill>
-          <a:ln>
-            <a:solidFill>
-              <a:schemeClr val="accent5">
-                <a:lumMod val="75000"/>
-              </a:schemeClr>
-            </a:solidFill>
-          </a:ln>
-          <a:effectLst/>
-        </p:spPr>
-        <p:style>
-          <a:lnRef idx="1">
-            <a:schemeClr val="accent3"/>
-          </a:lnRef>
-          <a:fillRef idx="2">
-            <a:schemeClr val="accent3"/>
-          </a:fillRef>
-          <a:effectRef idx="1">
-            <a:schemeClr val="accent3"/>
-          </a:effectRef>
-          <a:fontRef idx="minor">
-            <a:schemeClr val="dk1"/>
-          </a:fontRef>
-        </p:style>
-        <p:txBody>
-          <a:bodyPr rtlCol="0" anchor="ctr"/>
-          <a:lstStyle/>
-          <a:p>
-            <a:pPr algn="ctr"/>
-            <a:endParaRPr lang="en-SG" sz="1400">
-              <a:solidFill>
-                <a:schemeClr val="dk1"/>
-              </a:solidFill>
-            </a:endParaRPr>
-          </a:p>
-        </p:txBody>
-      </p:sp>
-      <p:cxnSp>
-        <p:nvCxnSpPr>
-          <p:cNvPr id="69" name="Straight Arrow Connector 68"/>
-          <p:cNvCxnSpPr/>
-          <p:nvPr/>
-        </p:nvCxnSpPr>
-        <p:spPr>
-          <a:xfrm>
-            <a:off x="7265132" y="5059243"/>
-            <a:ext cx="1295400" cy="0"/>
-          </a:xfrm>
-          <a:prstGeom prst="straightConnector1">
-            <a:avLst/>
-          </a:prstGeom>
-          <a:ln w="19050">
-            <a:solidFill>
-              <a:srgbClr val="7030A0"/>
-            </a:solidFill>
-            <a:tailEnd type="arrow"/>
-          </a:ln>
-        </p:spPr>
-        <p:style>
-          <a:lnRef idx="1">
-            <a:schemeClr val="accent1"/>
-          </a:lnRef>
-          <a:fillRef idx="0">
-            <a:schemeClr val="accent1"/>
-          </a:fillRef>
-          <a:effectRef idx="0">
-            <a:schemeClr val="accent1"/>
-          </a:effectRef>
-          <a:fontRef idx="minor">
-            <a:schemeClr val="tx1"/>
-          </a:fontRef>
-        </p:style>
-      </p:cxnSp>
-      <p:cxnSp>
-        <p:nvCxnSpPr>
-          <p:cNvPr id="70" name="Straight Arrow Connector 69"/>
-          <p:cNvCxnSpPr/>
-          <p:nvPr/>
-        </p:nvCxnSpPr>
-        <p:spPr>
-          <a:xfrm>
-            <a:off x="7161845" y="6096000"/>
-            <a:ext cx="1448755" cy="0"/>
-          </a:xfrm>
-          <a:prstGeom prst="straightConnector1">
-            <a:avLst/>
-          </a:prstGeom>
-          <a:ln w="19050">
-            <a:solidFill>
-              <a:schemeClr val="accent5">
-                <a:lumMod val="75000"/>
-              </a:schemeClr>
-            </a:solidFill>
-            <a:prstDash val="sysDash"/>
-            <a:headEnd type="arrow" w="med" len="med"/>
-            <a:tailEnd type="none" w="med" len="med"/>
-          </a:ln>
-        </p:spPr>
-        <p:style>
-          <a:lnRef idx="1">
-            <a:schemeClr val="accent1"/>
-          </a:lnRef>
-          <a:fillRef idx="0">
-            <a:schemeClr val="accent1"/>
-          </a:fillRef>
-          <a:effectRef idx="0">
-            <a:schemeClr val="accent1"/>
-          </a:effectRef>
-          <a:fontRef idx="minor">
-            <a:schemeClr val="tx1"/>
-          </a:fontRef>
-        </p:style>
-      </p:cxnSp>
-      <p:cxnSp>
-        <p:nvCxnSpPr>
-          <p:cNvPr id="72" name="Straight Arrow Connector 71"/>
-          <p:cNvCxnSpPr/>
-          <p:nvPr/>
-        </p:nvCxnSpPr>
-        <p:spPr>
-          <a:xfrm>
-            <a:off x="5205847" y="5444618"/>
-            <a:ext cx="3354685" cy="0"/>
-          </a:xfrm>
-          <a:prstGeom prst="straightConnector1">
-            <a:avLst/>
-          </a:prstGeom>
-          <a:ln w="19050">
-            <a:solidFill>
-              <a:schemeClr val="accent5">
-                <a:lumMod val="75000"/>
-              </a:schemeClr>
-            </a:solidFill>
-            <a:headEnd type="arrow" w="med" len="med"/>
-            <a:tailEnd type="none" w="med" len="med"/>
-          </a:ln>
-        </p:spPr>
-        <p:style>
-          <a:lnRef idx="1">
-            <a:schemeClr val="accent1"/>
-          </a:lnRef>
-          <a:fillRef idx="0">
-            <a:schemeClr val="accent1"/>
-          </a:fillRef>
-          <a:effectRef idx="0">
-            <a:schemeClr val="accent1"/>
-          </a:effectRef>
-          <a:fontRef idx="minor">
-            <a:schemeClr val="tx1"/>
-          </a:fontRef>
-        </p:style>
-      </p:cxnSp>
-      <p:sp>
-        <p:nvSpPr>
-          <p:cNvPr id="74" name="TextBox 73"/>
-          <p:cNvSpPr txBox="1"/>
-          <p:nvPr/>
-        </p:nvSpPr>
-        <p:spPr>
-          <a:xfrm>
-            <a:off x="5334000" y="5153188"/>
-            <a:ext cx="2286506" cy="215444"/>
-          </a:xfrm>
-          <a:prstGeom prst="rect">
-            <a:avLst/>
-          </a:prstGeom>
-          <a:noFill/>
-        </p:spPr>
-        <p:txBody>
-          <a:bodyPr wrap="square" lIns="0" tIns="0" rIns="0" bIns="0" rtlCol="0">
-            <a:spAutoFit/>
-          </a:bodyPr>
-          <a:lstStyle/>
-          <a:p>
-            <a:r>
-              <a:rPr lang="en-US" sz="1400" dirty="0" err="1" smtClean="0">
-                <a:solidFill>
-                  <a:srgbClr val="0070C0"/>
-                </a:solidFill>
-              </a:rPr>
-              <a:t>handleModelChangedEvent</a:t>
-            </a:r>
-            <a:r>
-              <a:rPr lang="en-US" sz="1400" dirty="0" smtClean="0">
-                <a:solidFill>
-                  <a:srgbClr val="0070C0"/>
-                </a:solidFill>
-              </a:rPr>
-              <a:t>()</a:t>
-            </a:r>
-            <a:endParaRPr lang="en-US" sz="1400" dirty="0">
-              <a:solidFill>
-                <a:srgbClr val="0070C0"/>
-              </a:solidFill>
-            </a:endParaRPr>
-          </a:p>
-        </p:txBody>
-      </p:sp>
-      <p:cxnSp>
-        <p:nvCxnSpPr>
-          <p:cNvPr id="77" name="Straight Arrow Connector 76"/>
-          <p:cNvCxnSpPr/>
-          <p:nvPr/>
-        </p:nvCxnSpPr>
-        <p:spPr>
-          <a:xfrm>
-            <a:off x="5205847" y="5822192"/>
-            <a:ext cx="3354685" cy="0"/>
-          </a:xfrm>
-          <a:prstGeom prst="straightConnector1">
-            <a:avLst/>
-          </a:prstGeom>
-          <a:ln w="19050">
-            <a:solidFill>
-              <a:srgbClr val="0070C0"/>
-            </a:solidFill>
-            <a:prstDash val="sysDash"/>
-            <a:headEnd type="none" w="med" len="med"/>
-            <a:tailEnd type="arrow" w="med" len="med"/>
-          </a:ln>
-        </p:spPr>
-        <p:style>
-          <a:lnRef idx="1">
-            <a:schemeClr val="accent1"/>
-          </a:lnRef>
-          <a:fillRef idx="0">
-            <a:schemeClr val="accent1"/>
-          </a:fillRef>
-          <a:effectRef idx="0">
-            <a:schemeClr val="accent1"/>
-          </a:effectRef>
-          <a:fontRef idx="minor">
-            <a:schemeClr val="tx1"/>
-          </a:fontRef>
-        </p:style>
-      </p:cxnSp>
       <p:cxnSp>
         <p:nvCxnSpPr>
           <p:cNvPr id="85" name="Straight Connector 84"/>
@@ -7054,7 +6788,7 @@
         </p:nvCxnSpPr>
         <p:spPr>
           <a:xfrm flipH="1">
-            <a:off x="945964" y="2262670"/>
+            <a:off x="314394" y="2262670"/>
             <a:ext cx="24" cy="1598671"/>
           </a:xfrm>
           <a:prstGeom prst="line">

</xml_diff>

<commit_message>
[118] Remove IncorrectCommandResult (#118)
* Rename events package controller -> ui

* Remove IncorrectCommandResult
</commit_message>
<xml_diff>
--- a/docs/diagrams/Diagrams.pptx
+++ b/docs/diagrams/Diagrams.pptx
@@ -199,7 +199,7 @@
           <a:p>
             <a:fld id="{F5CC4B3F-88C1-4FFA-B1B6-F41C21DC6924}" type="datetimeFigureOut">
               <a:rPr lang="en-US" smtClean="0"/>
-              <a:t>9/26/2016</a:t>
+              <a:t>9/28/2016</a:t>
             </a:fld>
             <a:endParaRPr lang="en-US"/>
           </a:p>
@@ -648,7 +648,7 @@
           <a:p>
             <a:fld id="{78C97017-6FC3-485B-9764-EAC9E56C1D49}" type="datetimeFigureOut">
               <a:rPr lang="en-US" smtClean="0"/>
-              <a:t>9/26/2016</a:t>
+              <a:t>9/28/2016</a:t>
             </a:fld>
             <a:endParaRPr lang="en-US"/>
           </a:p>
@@ -818,7 +818,7 @@
           <a:p>
             <a:fld id="{78C97017-6FC3-485B-9764-EAC9E56C1D49}" type="datetimeFigureOut">
               <a:rPr lang="en-US" smtClean="0"/>
-              <a:t>9/26/2016</a:t>
+              <a:t>9/28/2016</a:t>
             </a:fld>
             <a:endParaRPr lang="en-US"/>
           </a:p>
@@ -998,7 +998,7 @@
           <a:p>
             <a:fld id="{78C97017-6FC3-485B-9764-EAC9E56C1D49}" type="datetimeFigureOut">
               <a:rPr lang="en-US" smtClean="0"/>
-              <a:t>9/26/2016</a:t>
+              <a:t>9/28/2016</a:t>
             </a:fld>
             <a:endParaRPr lang="en-US"/>
           </a:p>
@@ -1168,7 +1168,7 @@
           <a:p>
             <a:fld id="{78C97017-6FC3-485B-9764-EAC9E56C1D49}" type="datetimeFigureOut">
               <a:rPr lang="en-US" smtClean="0"/>
-              <a:t>9/26/2016</a:t>
+              <a:t>9/28/2016</a:t>
             </a:fld>
             <a:endParaRPr lang="en-US"/>
           </a:p>
@@ -1414,7 +1414,7 @@
           <a:p>
             <a:fld id="{78C97017-6FC3-485B-9764-EAC9E56C1D49}" type="datetimeFigureOut">
               <a:rPr lang="en-US" smtClean="0"/>
-              <a:t>9/26/2016</a:t>
+              <a:t>9/28/2016</a:t>
             </a:fld>
             <a:endParaRPr lang="en-US"/>
           </a:p>
@@ -1702,7 +1702,7 @@
           <a:p>
             <a:fld id="{78C97017-6FC3-485B-9764-EAC9E56C1D49}" type="datetimeFigureOut">
               <a:rPr lang="en-US" smtClean="0"/>
-              <a:t>9/26/2016</a:t>
+              <a:t>9/28/2016</a:t>
             </a:fld>
             <a:endParaRPr lang="en-US"/>
           </a:p>
@@ -2124,7 +2124,7 @@
           <a:p>
             <a:fld id="{78C97017-6FC3-485B-9764-EAC9E56C1D49}" type="datetimeFigureOut">
               <a:rPr lang="en-US" smtClean="0"/>
-              <a:t>9/26/2016</a:t>
+              <a:t>9/28/2016</a:t>
             </a:fld>
             <a:endParaRPr lang="en-US"/>
           </a:p>
@@ -2242,7 +2242,7 @@
           <a:p>
             <a:fld id="{78C97017-6FC3-485B-9764-EAC9E56C1D49}" type="datetimeFigureOut">
               <a:rPr lang="en-US" smtClean="0"/>
-              <a:t>9/26/2016</a:t>
+              <a:t>9/28/2016</a:t>
             </a:fld>
             <a:endParaRPr lang="en-US"/>
           </a:p>
@@ -2337,7 +2337,7 @@
           <a:p>
             <a:fld id="{78C97017-6FC3-485B-9764-EAC9E56C1D49}" type="datetimeFigureOut">
               <a:rPr lang="en-US" smtClean="0"/>
-              <a:t>9/26/2016</a:t>
+              <a:t>9/28/2016</a:t>
             </a:fld>
             <a:endParaRPr lang="en-US"/>
           </a:p>
@@ -2614,7 +2614,7 @@
           <a:p>
             <a:fld id="{78C97017-6FC3-485B-9764-EAC9E56C1D49}" type="datetimeFigureOut">
               <a:rPr lang="en-US" smtClean="0"/>
-              <a:t>9/26/2016</a:t>
+              <a:t>9/28/2016</a:t>
             </a:fld>
             <a:endParaRPr lang="en-US"/>
           </a:p>
@@ -2867,7 +2867,7 @@
           <a:p>
             <a:fld id="{78C97017-6FC3-485B-9764-EAC9E56C1D49}" type="datetimeFigureOut">
               <a:rPr lang="en-US" smtClean="0"/>
-              <a:t>9/26/2016</a:t>
+              <a:t>9/28/2016</a:t>
             </a:fld>
             <a:endParaRPr lang="en-US"/>
           </a:p>
@@ -3080,7 +3080,7 @@
           <a:p>
             <a:fld id="{78C97017-6FC3-485B-9764-EAC9E56C1D49}" type="datetimeFigureOut">
               <a:rPr lang="en-US" smtClean="0"/>
-              <a:t>9/26/2016</a:t>
+              <a:t>9/28/2016</a:t>
             </a:fld>
             <a:endParaRPr lang="en-US"/>
           </a:p>
@@ -9158,7 +9158,7 @@
         </p:nvSpPr>
         <p:spPr>
           <a:xfrm>
-            <a:off x="2095948" y="2396440"/>
+            <a:off x="2095948" y="2548840"/>
             <a:ext cx="1093635" cy="346760"/>
           </a:xfrm>
           <a:prstGeom prst="rect">
@@ -9217,7 +9217,7 @@
         </p:nvSpPr>
         <p:spPr>
           <a:xfrm flipH="1">
-            <a:off x="6180592" y="3048000"/>
+            <a:off x="6180592" y="2648528"/>
             <a:ext cx="1093635" cy="346760"/>
           </a:xfrm>
           <a:prstGeom prst="rect">
@@ -9328,19 +9328,18 @@
         <p:nvCxnSpPr>
           <p:cNvPr id="7" name="Elbow Connector 63"/>
           <p:cNvCxnSpPr>
-            <a:endCxn id="4" idx="0"/>
+            <a:endCxn id="4" idx="3"/>
           </p:cNvCxnSpPr>
           <p:nvPr/>
         </p:nvCxnSpPr>
         <p:spPr>
           <a:xfrm rot="10800000">
-            <a:off x="2642766" y="2396440"/>
-            <a:ext cx="2843634" cy="1360484"/>
-          </a:xfrm>
-          <a:prstGeom prst="bentConnector4">
+            <a:off x="3189584" y="2722220"/>
+            <a:ext cx="2296817" cy="1187104"/>
+          </a:xfrm>
+          <a:prstGeom prst="bentConnector3">
             <a:avLst>
-              <a:gd name="adj1" fmla="val 758"/>
-              <a:gd name="adj2" fmla="val 116803"/>
+              <a:gd name="adj1" fmla="val -267"/>
             </a:avLst>
           </a:prstGeom>
           <a:ln w="19050">
@@ -9426,7 +9425,7 @@
         </p:nvCxnSpPr>
         <p:spPr>
           <a:xfrm>
-            <a:off x="1676400" y="2566960"/>
+            <a:off x="1676400" y="2719360"/>
             <a:ext cx="419548" cy="2860"/>
           </a:xfrm>
           <a:prstGeom prst="bentConnector3">
@@ -9527,7 +9526,7 @@
         </p:nvSpPr>
         <p:spPr>
           <a:xfrm flipH="1">
-            <a:off x="6180592" y="3454400"/>
+            <a:off x="6180592" y="3054928"/>
             <a:ext cx="1093635" cy="346760"/>
           </a:xfrm>
           <a:prstGeom prst="rect">
@@ -9631,49 +9630,6 @@
           </a:p>
         </p:txBody>
       </p:sp>
-      <p:cxnSp>
-        <p:nvCxnSpPr>
-          <p:cNvPr id="13" name="Elbow Connector 63"/>
-          <p:cNvCxnSpPr>
-            <a:stCxn id="27" idx="3"/>
-            <a:endCxn id="26" idx="0"/>
-          </p:cNvCxnSpPr>
-          <p:nvPr/>
-        </p:nvCxnSpPr>
-        <p:spPr>
-          <a:xfrm rot="5400000">
-            <a:off x="2598392" y="2958698"/>
-            <a:ext cx="92399" cy="3650"/>
-          </a:xfrm>
-          <a:prstGeom prst="bentConnector3">
-            <a:avLst>
-              <a:gd name="adj1" fmla="val 50000"/>
-            </a:avLst>
-          </a:prstGeom>
-          <a:ln w="19050">
-            <a:solidFill>
-              <a:srgbClr val="0070C0"/>
-            </a:solidFill>
-            <a:headEnd type="none" w="med" len="med"/>
-            <a:tailEnd type="none" w="med" len="med"/>
-          </a:ln>
-          <a:effectLst/>
-        </p:spPr>
-        <p:style>
-          <a:lnRef idx="1">
-            <a:schemeClr val="accent2"/>
-          </a:lnRef>
-          <a:fillRef idx="2">
-            <a:schemeClr val="accent2"/>
-          </a:fillRef>
-          <a:effectRef idx="1">
-            <a:schemeClr val="accent2"/>
-          </a:effectRef>
-          <a:fontRef idx="minor">
-            <a:schemeClr val="dk1"/>
-          </a:fontRef>
-        </p:style>
-      </p:cxnSp>
       <p:sp>
         <p:nvSpPr>
           <p:cNvPr id="14" name="Rectangle 62"/>
@@ -9756,8 +9712,8 @@
         </p:nvCxnSpPr>
         <p:spPr>
           <a:xfrm rot="10800000" flipV="1">
-            <a:off x="5786402" y="3221380"/>
-            <a:ext cx="394190" cy="679594"/>
+            <a:off x="5786402" y="2821908"/>
+            <a:ext cx="394190" cy="1079066"/>
           </a:xfrm>
           <a:prstGeom prst="bentConnector3">
             <a:avLst>
@@ -9842,8 +9798,8 @@
         </p:nvCxnSpPr>
         <p:spPr>
           <a:xfrm flipV="1">
-            <a:off x="5786402" y="3627780"/>
-            <a:ext cx="394190" cy="273194"/>
+            <a:off x="5786402" y="3228308"/>
+            <a:ext cx="394190" cy="672666"/>
           </a:xfrm>
           <a:prstGeom prst="bentConnector3">
             <a:avLst>
@@ -10266,142 +10222,6 @@
           </a:fontRef>
         </p:style>
       </p:cxnSp>
-      <p:sp>
-        <p:nvSpPr>
-          <p:cNvPr id="26" name="Rectangle 8"/>
-          <p:cNvSpPr/>
-          <p:nvPr/>
-        </p:nvSpPr>
-        <p:spPr>
-          <a:xfrm>
-            <a:off x="1977093" y="3006723"/>
-            <a:ext cx="1331346" cy="346760"/>
-          </a:xfrm>
-          <a:prstGeom prst="rect">
-            <a:avLst/>
-          </a:prstGeom>
-          <a:solidFill>
-            <a:srgbClr val="0070C0"/>
-          </a:solidFill>
-          <a:ln w="19050">
-            <a:solidFill>
-              <a:srgbClr val="0070C0"/>
-            </a:solidFill>
-          </a:ln>
-          <a:effectLst/>
-        </p:spPr>
-        <p:style>
-          <a:lnRef idx="1">
-            <a:schemeClr val="accent2"/>
-          </a:lnRef>
-          <a:fillRef idx="2">
-            <a:schemeClr val="accent2"/>
-          </a:fillRef>
-          <a:effectRef idx="1">
-            <a:schemeClr val="accent2"/>
-          </a:effectRef>
-          <a:fontRef idx="minor">
-            <a:schemeClr val="dk1"/>
-          </a:fontRef>
-        </p:style>
-        <p:txBody>
-          <a:bodyPr rtlCol="0" anchor="ctr"/>
-          <a:lstStyle/>
-          <a:p>
-            <a:pPr algn="ctr"/>
-            <a:r>
-              <a:rPr lang="en-US" sz="1050" dirty="0" err="1">
-                <a:solidFill>
-                  <a:schemeClr val="bg1"/>
-                </a:solidFill>
-              </a:rPr>
-              <a:t>IncorrectCommand</a:t>
-            </a:r>
-            <a:r>
-              <a:rPr lang="en-US" sz="1050" dirty="0">
-                <a:solidFill>
-                  <a:schemeClr val="bg1"/>
-                </a:solidFill>
-              </a:rPr>
-              <a:t/>
-            </a:r>
-            <a:br>
-              <a:rPr lang="en-US" sz="1050" dirty="0">
-                <a:solidFill>
-                  <a:schemeClr val="bg1"/>
-                </a:solidFill>
-              </a:rPr>
-            </a:br>
-            <a:r>
-              <a:rPr lang="en-US" sz="1050" dirty="0">
-                <a:solidFill>
-                  <a:schemeClr val="bg1"/>
-                </a:solidFill>
-              </a:rPr>
-              <a:t>Result</a:t>
-            </a:r>
-            <a:endParaRPr lang="en-SG" sz="1050" dirty="0">
-              <a:solidFill>
-                <a:schemeClr val="bg1"/>
-              </a:solidFill>
-            </a:endParaRPr>
-          </a:p>
-        </p:txBody>
-      </p:sp>
-      <p:sp>
-        <p:nvSpPr>
-          <p:cNvPr id="27" name="Isosceles Triangle 102"/>
-          <p:cNvSpPr/>
-          <p:nvPr/>
-        </p:nvSpPr>
-        <p:spPr>
-          <a:xfrm rot="10800000" flipV="1">
-            <a:off x="2511164" y="2738801"/>
-            <a:ext cx="270504" cy="175523"/>
-          </a:xfrm>
-          <a:prstGeom prst="triangle">
-            <a:avLst/>
-          </a:prstGeom>
-          <a:solidFill>
-            <a:schemeClr val="tx2">
-              <a:lumMod val="60000"/>
-              <a:lumOff val="40000"/>
-            </a:schemeClr>
-          </a:solidFill>
-          <a:ln w="19050">
-            <a:solidFill>
-              <a:srgbClr val="0070C0"/>
-            </a:solidFill>
-          </a:ln>
-          <a:effectLst/>
-        </p:spPr>
-        <p:style>
-          <a:lnRef idx="1">
-            <a:schemeClr val="accent1"/>
-          </a:lnRef>
-          <a:fillRef idx="2">
-            <a:schemeClr val="accent1"/>
-          </a:fillRef>
-          <a:effectRef idx="1">
-            <a:schemeClr val="accent1"/>
-          </a:effectRef>
-          <a:fontRef idx="minor">
-            <a:schemeClr val="dk1"/>
-          </a:fontRef>
-        </p:style>
-        <p:txBody>
-          <a:bodyPr rtlCol="0" anchor="ctr"/>
-          <a:lstStyle/>
-          <a:p>
-            <a:pPr algn="ctr"/>
-            <a:endParaRPr lang="en-SG" sz="1050" b="1">
-              <a:solidFill>
-                <a:srgbClr val="92D050"/>
-              </a:solidFill>
-            </a:endParaRPr>
-          </a:p>
-        </p:txBody>
-      </p:sp>
       <p:cxnSp>
         <p:nvCxnSpPr>
           <p:cNvPr id="28" name="Elbow Connector 122"/>
@@ -10597,7 +10417,7 @@
         </p:nvGrpSpPr>
         <p:grpSpPr>
           <a:xfrm>
-            <a:off x="3973516" y="2165608"/>
+            <a:off x="3973516" y="2512368"/>
             <a:ext cx="868568" cy="230832"/>
             <a:chOff x="2755838" y="789460"/>
             <a:chExt cx="868568" cy="230832"/>
@@ -10696,7 +10516,7 @@
         </p:nvSpPr>
         <p:spPr>
           <a:xfrm>
-            <a:off x="2412448" y="2177461"/>
+            <a:off x="3210180" y="2423264"/>
             <a:ext cx="131116" cy="230832"/>
           </a:xfrm>
           <a:prstGeom prst="rect">
@@ -10866,6 +10686,120 @@
           </p:txBody>
         </p:sp>
       </p:grpSp>
+      <p:sp>
+        <p:nvSpPr>
+          <p:cNvPr id="44" name="Rectangle 11"/>
+          <p:cNvSpPr/>
+          <p:nvPr/>
+        </p:nvSpPr>
+        <p:spPr>
+          <a:xfrm flipH="1">
+            <a:off x="6185390" y="3458098"/>
+            <a:ext cx="1093635" cy="346760"/>
+          </a:xfrm>
+          <a:prstGeom prst="rect">
+            <a:avLst/>
+          </a:prstGeom>
+          <a:ln w="19050">
+            <a:solidFill>
+              <a:srgbClr val="0070C0"/>
+            </a:solidFill>
+          </a:ln>
+          <a:effectLst/>
+        </p:spPr>
+        <p:style>
+          <a:lnRef idx="1">
+            <a:schemeClr val="accent1"/>
+          </a:lnRef>
+          <a:fillRef idx="2">
+            <a:schemeClr val="accent1"/>
+          </a:fillRef>
+          <a:effectRef idx="1">
+            <a:schemeClr val="accent1"/>
+          </a:effectRef>
+          <a:fontRef idx="minor">
+            <a:schemeClr val="dk1"/>
+          </a:fontRef>
+        </p:style>
+        <p:txBody>
+          <a:bodyPr rtlCol="0" anchor="ctr"/>
+          <a:lstStyle/>
+          <a:p>
+            <a:pPr algn="ctr"/>
+            <a:r>
+              <a:rPr lang="en-US" sz="1050" b="1" dirty="0" smtClean="0">
+                <a:solidFill>
+                  <a:srgbClr val="0070C0"/>
+                </a:solidFill>
+              </a:rPr>
+              <a:t>Incorrect</a:t>
+            </a:r>
+            <a:br>
+              <a:rPr lang="en-US" sz="1050" b="1" dirty="0" smtClean="0">
+                <a:solidFill>
+                  <a:srgbClr val="0070C0"/>
+                </a:solidFill>
+              </a:rPr>
+            </a:br>
+            <a:r>
+              <a:rPr lang="en-US" sz="1050" b="1" dirty="0" smtClean="0">
+                <a:solidFill>
+                  <a:srgbClr val="0070C0"/>
+                </a:solidFill>
+              </a:rPr>
+              <a:t>Command</a:t>
+            </a:r>
+            <a:endParaRPr lang="en-SG" sz="1050" b="1" dirty="0">
+              <a:solidFill>
+                <a:srgbClr val="0070C0"/>
+              </a:solidFill>
+            </a:endParaRPr>
+          </a:p>
+        </p:txBody>
+      </p:sp>
+      <p:cxnSp>
+        <p:nvCxnSpPr>
+          <p:cNvPr id="45" name="Elbow Connector 63"/>
+          <p:cNvCxnSpPr>
+            <a:stCxn id="8" idx="3"/>
+            <a:endCxn id="44" idx="3"/>
+          </p:cNvCxnSpPr>
+          <p:nvPr/>
+        </p:nvCxnSpPr>
+        <p:spPr>
+          <a:xfrm flipV="1">
+            <a:off x="5786402" y="3631478"/>
+            <a:ext cx="398988" cy="269496"/>
+          </a:xfrm>
+          <a:prstGeom prst="bentConnector3">
+            <a:avLst>
+              <a:gd name="adj1" fmla="val 50000"/>
+            </a:avLst>
+          </a:prstGeom>
+          <a:ln w="19050">
+            <a:solidFill>
+              <a:srgbClr val="0070C0"/>
+            </a:solidFill>
+            <a:headEnd type="none" w="med" len="med"/>
+            <a:tailEnd type="none" w="med" len="med"/>
+          </a:ln>
+          <a:effectLst/>
+        </p:spPr>
+        <p:style>
+          <a:lnRef idx="1">
+            <a:schemeClr val="accent2"/>
+          </a:lnRef>
+          <a:fillRef idx="2">
+            <a:schemeClr val="accent2"/>
+          </a:fillRef>
+          <a:effectRef idx="1">
+            <a:schemeClr val="accent2"/>
+          </a:effectRef>
+          <a:fontRef idx="minor">
+            <a:schemeClr val="dk1"/>
+          </a:fontRef>
+        </p:style>
+      </p:cxnSp>
     </p:spTree>
     <p:extLst>
       <p:ext uri="{BB962C8B-B14F-4D97-AF65-F5344CB8AC3E}">

</xml_diff>

<commit_message>
Update DeletePerson SD to show UI update
</commit_message>
<xml_diff>
--- a/docs/diagrams/Diagrams.pptx
+++ b/docs/diagrams/Diagrams.pptx
@@ -199,7 +199,7 @@
           <a:p>
             <a:fld id="{F5CC4B3F-88C1-4FFA-B1B6-F41C21DC6924}" type="datetimeFigureOut">
               <a:rPr lang="en-US" smtClean="0"/>
-              <a:t>9/28/2016</a:t>
+              <a:t>9/29/2016</a:t>
             </a:fld>
             <a:endParaRPr lang="en-US"/>
           </a:p>
@@ -648,7 +648,7 @@
           <a:p>
             <a:fld id="{78C97017-6FC3-485B-9764-EAC9E56C1D49}" type="datetimeFigureOut">
               <a:rPr lang="en-US" smtClean="0"/>
-              <a:t>9/28/2016</a:t>
+              <a:t>9/29/2016</a:t>
             </a:fld>
             <a:endParaRPr lang="en-US"/>
           </a:p>
@@ -818,7 +818,7 @@
           <a:p>
             <a:fld id="{78C97017-6FC3-485B-9764-EAC9E56C1D49}" type="datetimeFigureOut">
               <a:rPr lang="en-US" smtClean="0"/>
-              <a:t>9/28/2016</a:t>
+              <a:t>9/29/2016</a:t>
             </a:fld>
             <a:endParaRPr lang="en-US"/>
           </a:p>
@@ -998,7 +998,7 @@
           <a:p>
             <a:fld id="{78C97017-6FC3-485B-9764-EAC9E56C1D49}" type="datetimeFigureOut">
               <a:rPr lang="en-US" smtClean="0"/>
-              <a:t>9/28/2016</a:t>
+              <a:t>9/29/2016</a:t>
             </a:fld>
             <a:endParaRPr lang="en-US"/>
           </a:p>
@@ -1168,7 +1168,7 @@
           <a:p>
             <a:fld id="{78C97017-6FC3-485B-9764-EAC9E56C1D49}" type="datetimeFigureOut">
               <a:rPr lang="en-US" smtClean="0"/>
-              <a:t>9/28/2016</a:t>
+              <a:t>9/29/2016</a:t>
             </a:fld>
             <a:endParaRPr lang="en-US"/>
           </a:p>
@@ -1414,7 +1414,7 @@
           <a:p>
             <a:fld id="{78C97017-6FC3-485B-9764-EAC9E56C1D49}" type="datetimeFigureOut">
               <a:rPr lang="en-US" smtClean="0"/>
-              <a:t>9/28/2016</a:t>
+              <a:t>9/29/2016</a:t>
             </a:fld>
             <a:endParaRPr lang="en-US"/>
           </a:p>
@@ -1702,7 +1702,7 @@
           <a:p>
             <a:fld id="{78C97017-6FC3-485B-9764-EAC9E56C1D49}" type="datetimeFigureOut">
               <a:rPr lang="en-US" smtClean="0"/>
-              <a:t>9/28/2016</a:t>
+              <a:t>9/29/2016</a:t>
             </a:fld>
             <a:endParaRPr lang="en-US"/>
           </a:p>
@@ -2124,7 +2124,7 @@
           <a:p>
             <a:fld id="{78C97017-6FC3-485B-9764-EAC9E56C1D49}" type="datetimeFigureOut">
               <a:rPr lang="en-US" smtClean="0"/>
-              <a:t>9/28/2016</a:t>
+              <a:t>9/29/2016</a:t>
             </a:fld>
             <a:endParaRPr lang="en-US"/>
           </a:p>
@@ -2242,7 +2242,7 @@
           <a:p>
             <a:fld id="{78C97017-6FC3-485B-9764-EAC9E56C1D49}" type="datetimeFigureOut">
               <a:rPr lang="en-US" smtClean="0"/>
-              <a:t>9/28/2016</a:t>
+              <a:t>9/29/2016</a:t>
             </a:fld>
             <a:endParaRPr lang="en-US"/>
           </a:p>
@@ -2337,7 +2337,7 @@
           <a:p>
             <a:fld id="{78C97017-6FC3-485B-9764-EAC9E56C1D49}" type="datetimeFigureOut">
               <a:rPr lang="en-US" smtClean="0"/>
-              <a:t>9/28/2016</a:t>
+              <a:t>9/29/2016</a:t>
             </a:fld>
             <a:endParaRPr lang="en-US"/>
           </a:p>
@@ -2614,7 +2614,7 @@
           <a:p>
             <a:fld id="{78C97017-6FC3-485B-9764-EAC9E56C1D49}" type="datetimeFigureOut">
               <a:rPr lang="en-US" smtClean="0"/>
-              <a:t>9/28/2016</a:t>
+              <a:t>9/29/2016</a:t>
             </a:fld>
             <a:endParaRPr lang="en-US"/>
           </a:p>
@@ -2867,7 +2867,7 @@
           <a:p>
             <a:fld id="{78C97017-6FC3-485B-9764-EAC9E56C1D49}" type="datetimeFigureOut">
               <a:rPr lang="en-US" smtClean="0"/>
-              <a:t>9/28/2016</a:t>
+              <a:t>9/29/2016</a:t>
             </a:fld>
             <a:endParaRPr lang="en-US"/>
           </a:p>
@@ -3080,7 +3080,7 @@
           <a:p>
             <a:fld id="{78C97017-6FC3-485B-9764-EAC9E56C1D49}" type="datetimeFigureOut">
               <a:rPr lang="en-US" smtClean="0"/>
-              <a:t>9/28/2016</a:t>
+              <a:t>9/29/2016</a:t>
             </a:fld>
             <a:endParaRPr lang="en-US"/>
           </a:p>
@@ -4898,7 +4898,7 @@
         </p:nvSpPr>
         <p:spPr>
           <a:xfrm>
-            <a:off x="1111860" y="1770924"/>
+            <a:off x="1111860" y="607926"/>
             <a:ext cx="1093635" cy="346760"/>
           </a:xfrm>
           <a:prstGeom prst="rect">
@@ -4957,7 +4957,7 @@
         </p:nvCxnSpPr>
         <p:spPr>
           <a:xfrm>
-            <a:off x="1658677" y="2134595"/>
+            <a:off x="1658677" y="971597"/>
             <a:ext cx="0" cy="1723059"/>
           </a:xfrm>
           <a:prstGeom prst="line">
@@ -4994,7 +4994,7 @@
         </p:nvSpPr>
         <p:spPr>
           <a:xfrm>
-            <a:off x="1586669" y="2485290"/>
+            <a:off x="1586669" y="1322292"/>
             <a:ext cx="152400" cy="1019910"/>
           </a:xfrm>
           <a:prstGeom prst="rect">
@@ -5045,7 +5045,7 @@
         </p:nvGrpSpPr>
         <p:grpSpPr>
           <a:xfrm>
-            <a:off x="152400" y="1696398"/>
+            <a:off x="152400" y="533400"/>
             <a:ext cx="324036" cy="573410"/>
             <a:chOff x="3239901" y="4149080"/>
             <a:chExt cx="648072" cy="1146820"/>
@@ -5262,7 +5262,7 @@
         </p:nvSpPr>
         <p:spPr>
           <a:xfrm>
-            <a:off x="3335583" y="1774611"/>
+            <a:off x="3335583" y="611613"/>
             <a:ext cx="1093635" cy="346760"/>
           </a:xfrm>
           <a:prstGeom prst="rect">
@@ -5321,7 +5321,7 @@
         </p:nvCxnSpPr>
         <p:spPr>
           <a:xfrm>
-            <a:off x="3882400" y="2138282"/>
+            <a:off x="3882400" y="975284"/>
             <a:ext cx="0" cy="1723059"/>
           </a:xfrm>
           <a:prstGeom prst="line">
@@ -5358,7 +5358,7 @@
         </p:nvSpPr>
         <p:spPr>
           <a:xfrm>
-            <a:off x="3810392" y="2596475"/>
+            <a:off x="3810392" y="1433477"/>
             <a:ext cx="144016" cy="832525"/>
           </a:xfrm>
           <a:prstGeom prst="rect">
@@ -5409,7 +5409,7 @@
         </p:nvSpPr>
         <p:spPr>
           <a:xfrm>
-            <a:off x="5316783" y="1770924"/>
+            <a:off x="5316783" y="607926"/>
             <a:ext cx="1093635" cy="346760"/>
           </a:xfrm>
           <a:prstGeom prst="rect">
@@ -5468,7 +5468,7 @@
         </p:nvCxnSpPr>
         <p:spPr>
           <a:xfrm>
-            <a:off x="5863600" y="2134595"/>
+            <a:off x="5863600" y="971597"/>
             <a:ext cx="0" cy="1723059"/>
           </a:xfrm>
           <a:prstGeom prst="line">
@@ -5505,7 +5505,7 @@
         </p:nvSpPr>
         <p:spPr>
           <a:xfrm>
-            <a:off x="5791592" y="2701406"/>
+            <a:off x="5791592" y="1538408"/>
             <a:ext cx="142006" cy="651394"/>
           </a:xfrm>
           <a:prstGeom prst="rect">
@@ -5556,7 +5556,7 @@
         </p:nvCxnSpPr>
         <p:spPr>
           <a:xfrm>
-            <a:off x="466818" y="2488977"/>
+            <a:off x="466818" y="1325979"/>
             <a:ext cx="1119851" cy="0"/>
           </a:xfrm>
           <a:prstGeom prst="straightConnector1">
@@ -5592,7 +5592,7 @@
         </p:nvSpPr>
         <p:spPr>
           <a:xfrm>
-            <a:off x="466818" y="2508878"/>
+            <a:off x="466818" y="1345880"/>
             <a:ext cx="860170" cy="215444"/>
           </a:xfrm>
           <a:prstGeom prst="rect">
@@ -5622,7 +5622,7 @@
         </p:nvCxnSpPr>
         <p:spPr>
           <a:xfrm>
-            <a:off x="1739069" y="2596476"/>
+            <a:off x="1739069" y="1433478"/>
             <a:ext cx="2071323" cy="0"/>
           </a:xfrm>
           <a:prstGeom prst="straightConnector1">
@@ -5658,7 +5658,7 @@
         </p:nvSpPr>
         <p:spPr>
           <a:xfrm>
-            <a:off x="2166172" y="2616377"/>
+            <a:off x="2166172" y="1453379"/>
             <a:ext cx="1424846" cy="215444"/>
           </a:xfrm>
           <a:prstGeom prst="rect">
@@ -5696,7 +5696,7 @@
         </p:nvCxnSpPr>
         <p:spPr>
           <a:xfrm>
-            <a:off x="3954408" y="2701407"/>
+            <a:off x="3954408" y="1538409"/>
             <a:ext cx="1837184" cy="0"/>
           </a:xfrm>
           <a:prstGeom prst="straightConnector1">
@@ -5732,7 +5732,7 @@
         </p:nvSpPr>
         <p:spPr>
           <a:xfrm>
-            <a:off x="4299772" y="2705581"/>
+            <a:off x="4299772" y="1542583"/>
             <a:ext cx="1424846" cy="215444"/>
           </a:xfrm>
           <a:prstGeom prst="rect">
@@ -5778,7 +5778,7 @@
         </p:nvSpPr>
         <p:spPr>
           <a:xfrm>
-            <a:off x="6074030" y="2850654"/>
+            <a:off x="6074030" y="1687656"/>
             <a:ext cx="2438400" cy="215444"/>
           </a:xfrm>
           <a:prstGeom prst="rect">
@@ -5840,7 +5840,7 @@
         </p:nvCxnSpPr>
         <p:spPr>
           <a:xfrm>
-            <a:off x="3954408" y="3353679"/>
+            <a:off x="3954408" y="2190681"/>
             <a:ext cx="1837184" cy="0"/>
           </a:xfrm>
           <a:prstGeom prst="straightConnector1">
@@ -5878,7 +5878,7 @@
         </p:nvCxnSpPr>
         <p:spPr>
           <a:xfrm>
-            <a:off x="1739069" y="3429000"/>
+            <a:off x="1739069" y="2266002"/>
             <a:ext cx="2058118" cy="0"/>
           </a:xfrm>
           <a:prstGeom prst="straightConnector1">
@@ -5916,7 +5916,7 @@
         </p:nvCxnSpPr>
         <p:spPr>
           <a:xfrm>
-            <a:off x="390618" y="3505200"/>
+            <a:off x="390618" y="2342202"/>
             <a:ext cx="1196051" cy="0"/>
           </a:xfrm>
           <a:prstGeom prst="straightConnector1">
@@ -5954,7 +5954,7 @@
         </p:nvSpPr>
         <p:spPr>
           <a:xfrm>
-            <a:off x="7696200" y="1754249"/>
+            <a:off x="7696200" y="591251"/>
             <a:ext cx="1371600" cy="346760"/>
           </a:xfrm>
           <a:prstGeom prst="rect">
@@ -6025,7 +6025,7 @@
         </p:nvCxnSpPr>
         <p:spPr>
           <a:xfrm>
-            <a:off x="8616802" y="2107303"/>
+            <a:off x="8616802" y="944305"/>
             <a:ext cx="0" cy="1723059"/>
           </a:xfrm>
           <a:prstGeom prst="line">
@@ -6064,7 +6064,7 @@
         </p:nvSpPr>
         <p:spPr>
           <a:xfrm>
-            <a:off x="8544794" y="3124200"/>
+            <a:off x="8544794" y="1961202"/>
             <a:ext cx="142006" cy="176787"/>
           </a:xfrm>
           <a:prstGeom prst="rect">
@@ -6119,7 +6119,7 @@
         </p:nvCxnSpPr>
         <p:spPr>
           <a:xfrm>
-            <a:off x="5943992" y="3124200"/>
+            <a:off x="5943992" y="1961202"/>
             <a:ext cx="2568438" cy="0"/>
           </a:xfrm>
           <a:prstGeom prst="straightConnector1">
@@ -6155,7 +6155,7 @@
         </p:nvCxnSpPr>
         <p:spPr>
           <a:xfrm>
-            <a:off x="5943992" y="3300987"/>
+            <a:off x="5943992" y="2137989"/>
             <a:ext cx="2549946" cy="0"/>
           </a:xfrm>
           <a:prstGeom prst="straightConnector1">
@@ -6298,7 +6298,7 @@
         <p:spPr>
           <a:xfrm>
             <a:off x="7844987" y="5335662"/>
-            <a:ext cx="131366" cy="324353"/>
+            <a:ext cx="124478" cy="287409"/>
           </a:xfrm>
           <a:prstGeom prst="rect">
             <a:avLst/>
@@ -6409,14 +6409,12 @@
       <p:cxnSp>
         <p:nvCxnSpPr>
           <p:cNvPr id="63" name="Straight Arrow Connector 62"/>
-          <p:cNvCxnSpPr>
-            <a:stCxn id="55" idx="2"/>
-          </p:cNvCxnSpPr>
+          <p:cNvCxnSpPr/>
           <p:nvPr/>
         </p:nvCxnSpPr>
         <p:spPr>
           <a:xfrm flipH="1">
-            <a:off x="4526729" y="5660015"/>
+            <a:off x="4526729" y="5623071"/>
             <a:ext cx="3383941" cy="0"/>
           </a:xfrm>
           <a:prstGeom prst="straightConnector1">
@@ -6788,7 +6786,7 @@
         </p:nvCxnSpPr>
         <p:spPr>
           <a:xfrm flipH="1">
-            <a:off x="314394" y="2262670"/>
+            <a:off x="314394" y="1099672"/>
             <a:ext cx="24" cy="1598671"/>
           </a:xfrm>
           <a:prstGeom prst="line">
@@ -6817,6 +6815,698 @@
           </a:fontRef>
         </p:style>
       </p:cxnSp>
+      <p:sp>
+        <p:nvSpPr>
+          <p:cNvPr id="45" name="Rectangle 62"/>
+          <p:cNvSpPr/>
+          <p:nvPr/>
+        </p:nvSpPr>
+        <p:spPr>
+          <a:xfrm>
+            <a:off x="721634" y="4278322"/>
+            <a:ext cx="1093635" cy="346760"/>
+          </a:xfrm>
+          <a:prstGeom prst="rect">
+            <a:avLst/>
+          </a:prstGeom>
+          <a:solidFill>
+            <a:srgbClr val="00B050"/>
+          </a:solidFill>
+          <a:ln w="19050">
+            <a:solidFill>
+              <a:srgbClr val="00B050"/>
+            </a:solidFill>
+          </a:ln>
+          <a:effectLst/>
+        </p:spPr>
+        <p:style>
+          <a:lnRef idx="1">
+            <a:schemeClr val="accent2"/>
+          </a:lnRef>
+          <a:fillRef idx="2">
+            <a:schemeClr val="accent2"/>
+          </a:fillRef>
+          <a:effectRef idx="1">
+            <a:schemeClr val="accent2"/>
+          </a:effectRef>
+          <a:fontRef idx="minor">
+            <a:schemeClr val="dk1"/>
+          </a:fontRef>
+        </p:style>
+        <p:txBody>
+          <a:bodyPr rtlCol="0" anchor="ctr"/>
+          <a:lstStyle/>
+          <a:p>
+            <a:pPr algn="ctr"/>
+            <a:r>
+              <a:rPr lang="en-US" sz="1600" dirty="0" smtClean="0">
+                <a:solidFill>
+                  <a:schemeClr val="bg1"/>
+                </a:solidFill>
+              </a:rPr>
+              <a:t>:UI</a:t>
+            </a:r>
+            <a:endParaRPr lang="en-SG" sz="1600" dirty="0">
+              <a:solidFill>
+                <a:schemeClr val="bg1"/>
+              </a:solidFill>
+            </a:endParaRPr>
+          </a:p>
+        </p:txBody>
+      </p:sp>
+      <p:cxnSp>
+        <p:nvCxnSpPr>
+          <p:cNvPr id="46" name="Straight Connector 45"/>
+          <p:cNvCxnSpPr/>
+          <p:nvPr/>
+        </p:nvCxnSpPr>
+        <p:spPr>
+          <a:xfrm>
+            <a:off x="1268451" y="4641993"/>
+            <a:ext cx="0" cy="1723059"/>
+          </a:xfrm>
+          <a:prstGeom prst="line">
+            <a:avLst/>
+          </a:prstGeom>
+          <a:ln w="19050">
+            <a:solidFill>
+              <a:srgbClr val="00B050"/>
+            </a:solidFill>
+            <a:prstDash val="sysDash"/>
+          </a:ln>
+          <a:effectLst/>
+        </p:spPr>
+        <p:style>
+          <a:lnRef idx="1">
+            <a:schemeClr val="accent1"/>
+          </a:lnRef>
+          <a:fillRef idx="2">
+            <a:schemeClr val="accent1"/>
+          </a:fillRef>
+          <a:effectRef idx="1">
+            <a:schemeClr val="accent1"/>
+          </a:effectRef>
+          <a:fontRef idx="minor">
+            <a:schemeClr val="dk1"/>
+          </a:fontRef>
+        </p:style>
+      </p:cxnSp>
+      <p:sp>
+        <p:nvSpPr>
+          <p:cNvPr id="47" name="Rectangle 46"/>
+          <p:cNvSpPr/>
+          <p:nvPr/>
+        </p:nvSpPr>
+        <p:spPr>
+          <a:xfrm>
+            <a:off x="1196443" y="5670472"/>
+            <a:ext cx="130545" cy="273128"/>
+          </a:xfrm>
+          <a:prstGeom prst="rect">
+            <a:avLst/>
+          </a:prstGeom>
+          <a:solidFill>
+            <a:srgbClr val="00B050"/>
+          </a:solidFill>
+          <a:ln>
+            <a:solidFill>
+              <a:srgbClr val="00B050"/>
+            </a:solidFill>
+          </a:ln>
+          <a:effectLst/>
+        </p:spPr>
+        <p:style>
+          <a:lnRef idx="1">
+            <a:schemeClr val="accent3"/>
+          </a:lnRef>
+          <a:fillRef idx="2">
+            <a:schemeClr val="accent3"/>
+          </a:fillRef>
+          <a:effectRef idx="1">
+            <a:schemeClr val="accent3"/>
+          </a:effectRef>
+          <a:fontRef idx="minor">
+            <a:schemeClr val="dk1"/>
+          </a:fontRef>
+        </p:style>
+        <p:txBody>
+          <a:bodyPr rtlCol="0" anchor="ctr"/>
+          <a:lstStyle/>
+          <a:p>
+            <a:pPr algn="ctr"/>
+            <a:endParaRPr lang="en-SG" sz="1400">
+              <a:solidFill>
+                <a:schemeClr val="dk1"/>
+              </a:solidFill>
+            </a:endParaRPr>
+          </a:p>
+        </p:txBody>
+      </p:sp>
+      <p:cxnSp>
+        <p:nvCxnSpPr>
+          <p:cNvPr id="48" name="Straight Arrow Connector 47"/>
+          <p:cNvCxnSpPr/>
+          <p:nvPr/>
+        </p:nvCxnSpPr>
+        <p:spPr>
+          <a:xfrm flipH="1">
+            <a:off x="1348843" y="5943600"/>
+            <a:ext cx="3061842" cy="0"/>
+          </a:xfrm>
+          <a:prstGeom prst="straightConnector1">
+            <a:avLst/>
+          </a:prstGeom>
+          <a:ln w="19050">
+            <a:solidFill>
+              <a:srgbClr val="00B050"/>
+            </a:solidFill>
+            <a:prstDash val="sysDash"/>
+            <a:headEnd type="arrow" w="med" len="med"/>
+            <a:tailEnd type="none" w="med" len="med"/>
+          </a:ln>
+        </p:spPr>
+        <p:style>
+          <a:lnRef idx="1">
+            <a:schemeClr val="accent1"/>
+          </a:lnRef>
+          <a:fillRef idx="0">
+            <a:schemeClr val="accent1"/>
+          </a:fillRef>
+          <a:effectRef idx="0">
+            <a:schemeClr val="accent1"/>
+          </a:effectRef>
+          <a:fontRef idx="minor">
+            <a:schemeClr val="tx1"/>
+          </a:fontRef>
+        </p:style>
+      </p:cxnSp>
+      <p:cxnSp>
+        <p:nvCxnSpPr>
+          <p:cNvPr id="49" name="Straight Arrow Connector 48"/>
+          <p:cNvCxnSpPr/>
+          <p:nvPr/>
+        </p:nvCxnSpPr>
+        <p:spPr>
+          <a:xfrm>
+            <a:off x="1348843" y="5670472"/>
+            <a:ext cx="3061841" cy="0"/>
+          </a:xfrm>
+          <a:prstGeom prst="straightConnector1">
+            <a:avLst/>
+          </a:prstGeom>
+          <a:ln w="19050">
+            <a:solidFill>
+              <a:schemeClr val="accent5">
+                <a:lumMod val="75000"/>
+              </a:schemeClr>
+            </a:solidFill>
+            <a:headEnd type="arrow" w="med" len="med"/>
+            <a:tailEnd type="none" w="med" len="med"/>
+          </a:ln>
+        </p:spPr>
+        <p:style>
+          <a:lnRef idx="1">
+            <a:schemeClr val="accent1"/>
+          </a:lnRef>
+          <a:fillRef idx="0">
+            <a:schemeClr val="accent1"/>
+          </a:fillRef>
+          <a:effectRef idx="0">
+            <a:schemeClr val="accent1"/>
+          </a:effectRef>
+          <a:fontRef idx="minor">
+            <a:schemeClr val="tx1"/>
+          </a:fontRef>
+        </p:style>
+      </p:cxnSp>
+      <p:sp>
+        <p:nvSpPr>
+          <p:cNvPr id="50" name="TextBox 49"/>
+          <p:cNvSpPr txBox="1"/>
+          <p:nvPr/>
+        </p:nvSpPr>
+        <p:spPr>
+          <a:xfrm>
+            <a:off x="1416276" y="5395369"/>
+            <a:ext cx="2659870" cy="215444"/>
+          </a:xfrm>
+          <a:prstGeom prst="rect">
+            <a:avLst/>
+          </a:prstGeom>
+          <a:noFill/>
+        </p:spPr>
+        <p:txBody>
+          <a:bodyPr wrap="square" lIns="0" tIns="0" rIns="0" bIns="0" rtlCol="0">
+            <a:spAutoFit/>
+          </a:bodyPr>
+          <a:lstStyle/>
+          <a:p>
+            <a:r>
+              <a:rPr lang="en-US" sz="1400" dirty="0" err="1" smtClean="0">
+                <a:solidFill>
+                  <a:srgbClr val="00B050"/>
+                </a:solidFill>
+              </a:rPr>
+              <a:t>handleAddresssBookChangedEvent</a:t>
+            </a:r>
+            <a:r>
+              <a:rPr lang="en-US" sz="1400" dirty="0" smtClean="0">
+                <a:solidFill>
+                  <a:srgbClr val="00B050"/>
+                </a:solidFill>
+              </a:rPr>
+              <a:t>()</a:t>
+            </a:r>
+            <a:endParaRPr lang="en-US" sz="1400" dirty="0">
+              <a:solidFill>
+                <a:srgbClr val="00B050"/>
+              </a:solidFill>
+            </a:endParaRPr>
+          </a:p>
+        </p:txBody>
+      </p:sp>
+      <p:grpSp>
+        <p:nvGrpSpPr>
+          <p:cNvPr id="13" name="Group 12"/>
+          <p:cNvGrpSpPr/>
+          <p:nvPr/>
+        </p:nvGrpSpPr>
+        <p:grpSpPr>
+          <a:xfrm>
+            <a:off x="1028134" y="5612032"/>
+            <a:ext cx="217349" cy="270072"/>
+            <a:chOff x="1028134" y="5612032"/>
+            <a:chExt cx="217349" cy="270072"/>
+          </a:xfrm>
+        </p:grpSpPr>
+        <p:sp>
+          <p:nvSpPr>
+            <p:cNvPr id="12" name="Freeform 11"/>
+            <p:cNvSpPr/>
+            <p:nvPr/>
+          </p:nvSpPr>
+          <p:spPr>
+            <a:xfrm rot="2600998" flipH="1" flipV="1">
+              <a:off x="1028134" y="5612032"/>
+              <a:ext cx="167452" cy="116880"/>
+            </a:xfrm>
+            <a:custGeom>
+              <a:avLst/>
+              <a:gdLst>
+                <a:gd name="connsiteX0" fmla="*/ 0 w 226400"/>
+                <a:gd name="connsiteY0" fmla="*/ 32920 h 171466"/>
+                <a:gd name="connsiteX1" fmla="*/ 157018 w 226400"/>
+                <a:gd name="connsiteY1" fmla="*/ 5211 h 171466"/>
+                <a:gd name="connsiteX2" fmla="*/ 221673 w 226400"/>
+                <a:gd name="connsiteY2" fmla="*/ 125284 h 171466"/>
+                <a:gd name="connsiteX3" fmla="*/ 36945 w 226400"/>
+                <a:gd name="connsiteY3" fmla="*/ 171466 h 171466"/>
+              </a:gdLst>
+              <a:ahLst/>
+              <a:cxnLst>
+                <a:cxn ang="0">
+                  <a:pos x="connsiteX0" y="connsiteY0"/>
+                </a:cxn>
+                <a:cxn ang="0">
+                  <a:pos x="connsiteX1" y="connsiteY1"/>
+                </a:cxn>
+                <a:cxn ang="0">
+                  <a:pos x="connsiteX2" y="connsiteY2"/>
+                </a:cxn>
+                <a:cxn ang="0">
+                  <a:pos x="connsiteX3" y="connsiteY3"/>
+                </a:cxn>
+              </a:cxnLst>
+              <a:rect l="l" t="t" r="r" b="b"/>
+              <a:pathLst>
+                <a:path w="226400" h="171466">
+                  <a:moveTo>
+                    <a:pt x="0" y="32920"/>
+                  </a:moveTo>
+                  <a:cubicBezTo>
+                    <a:pt x="60036" y="11368"/>
+                    <a:pt x="120073" y="-10183"/>
+                    <a:pt x="157018" y="5211"/>
+                  </a:cubicBezTo>
+                  <a:cubicBezTo>
+                    <a:pt x="193963" y="20605"/>
+                    <a:pt x="241685" y="97575"/>
+                    <a:pt x="221673" y="125284"/>
+                  </a:cubicBezTo>
+                  <a:cubicBezTo>
+                    <a:pt x="201661" y="152993"/>
+                    <a:pt x="119303" y="162229"/>
+                    <a:pt x="36945" y="171466"/>
+                  </a:cubicBezTo>
+                </a:path>
+              </a:pathLst>
+            </a:custGeom>
+            <a:ln w="19050">
+              <a:solidFill>
+                <a:srgbClr val="00B050"/>
+              </a:solidFill>
+              <a:headEnd type="arrow" w="med" len="med"/>
+              <a:tailEnd type="none" w="med" len="med"/>
+            </a:ln>
+          </p:spPr>
+          <p:style>
+            <a:lnRef idx="1">
+              <a:schemeClr val="accent1"/>
+            </a:lnRef>
+            <a:fillRef idx="0">
+              <a:schemeClr val="accent1"/>
+            </a:fillRef>
+            <a:effectRef idx="0">
+              <a:schemeClr val="accent1"/>
+            </a:effectRef>
+            <a:fontRef idx="minor">
+              <a:schemeClr val="tx1"/>
+            </a:fontRef>
+          </p:style>
+          <p:txBody>
+            <a:bodyPr rtlCol="0" anchor="ctr"/>
+            <a:lstStyle/>
+            <a:p>
+              <a:pPr algn="ctr"/>
+              <a:endParaRPr lang="en-SG"/>
+            </a:p>
+          </p:txBody>
+        </p:sp>
+        <p:sp>
+          <p:nvSpPr>
+            <p:cNvPr id="56" name="Rectangle 55"/>
+            <p:cNvSpPr/>
+            <p:nvPr/>
+          </p:nvSpPr>
+          <p:spPr>
+            <a:xfrm>
+              <a:off x="1147403" y="5712513"/>
+              <a:ext cx="98080" cy="169591"/>
+            </a:xfrm>
+            <a:prstGeom prst="rect">
+              <a:avLst/>
+            </a:prstGeom>
+            <a:solidFill>
+              <a:srgbClr val="00B050"/>
+            </a:solidFill>
+            <a:ln>
+              <a:solidFill>
+                <a:schemeClr val="bg1"/>
+              </a:solidFill>
+            </a:ln>
+            <a:effectLst/>
+          </p:spPr>
+          <p:style>
+            <a:lnRef idx="1">
+              <a:schemeClr val="accent3"/>
+            </a:lnRef>
+            <a:fillRef idx="2">
+              <a:schemeClr val="accent3"/>
+            </a:fillRef>
+            <a:effectRef idx="1">
+              <a:schemeClr val="accent3"/>
+            </a:effectRef>
+            <a:fontRef idx="minor">
+              <a:schemeClr val="dk1"/>
+            </a:fontRef>
+          </p:style>
+          <p:txBody>
+            <a:bodyPr rtlCol="0" anchor="ctr"/>
+            <a:lstStyle/>
+            <a:p>
+              <a:pPr algn="ctr"/>
+              <a:endParaRPr lang="en-SG" sz="1400">
+                <a:solidFill>
+                  <a:schemeClr val="dk1"/>
+                </a:solidFill>
+              </a:endParaRPr>
+            </a:p>
+          </p:txBody>
+        </p:sp>
+      </p:grpSp>
+      <p:sp>
+        <p:nvSpPr>
+          <p:cNvPr id="57" name="TextBox 56"/>
+          <p:cNvSpPr txBox="1"/>
+          <p:nvPr/>
+        </p:nvSpPr>
+        <p:spPr>
+          <a:xfrm>
+            <a:off x="194562" y="5444571"/>
+            <a:ext cx="794081" cy="430887"/>
+          </a:xfrm>
+          <a:prstGeom prst="rect">
+            <a:avLst/>
+          </a:prstGeom>
+          <a:noFill/>
+        </p:spPr>
+        <p:txBody>
+          <a:bodyPr wrap="square" lIns="0" tIns="0" rIns="0" bIns="0" rtlCol="0">
+            <a:spAutoFit/>
+          </a:bodyPr>
+          <a:lstStyle/>
+          <a:p>
+            <a:pPr algn="r"/>
+            <a:r>
+              <a:rPr lang="en-US" sz="1400" dirty="0" smtClean="0">
+                <a:solidFill>
+                  <a:srgbClr val="00B050"/>
+                </a:solidFill>
+              </a:rPr>
+              <a:t>Update status bar</a:t>
+            </a:r>
+            <a:endParaRPr lang="en-US" sz="1400" dirty="0">
+              <a:solidFill>
+                <a:srgbClr val="00B050"/>
+              </a:solidFill>
+            </a:endParaRPr>
+          </a:p>
+        </p:txBody>
+      </p:sp>
+      <p:grpSp>
+        <p:nvGrpSpPr>
+          <p:cNvPr id="58" name="Group 57"/>
+          <p:cNvGrpSpPr/>
+          <p:nvPr/>
+        </p:nvGrpSpPr>
+        <p:grpSpPr>
+          <a:xfrm flipH="1">
+            <a:off x="7936842" y="5335662"/>
+            <a:ext cx="217349" cy="270072"/>
+            <a:chOff x="1028134" y="5612032"/>
+            <a:chExt cx="217349" cy="270072"/>
+          </a:xfrm>
+        </p:grpSpPr>
+        <p:sp>
+          <p:nvSpPr>
+            <p:cNvPr id="59" name="Freeform 58"/>
+            <p:cNvSpPr/>
+            <p:nvPr/>
+          </p:nvSpPr>
+          <p:spPr>
+            <a:xfrm rot="2600998" flipH="1" flipV="1">
+              <a:off x="1028134" y="5612032"/>
+              <a:ext cx="167452" cy="116880"/>
+            </a:xfrm>
+            <a:custGeom>
+              <a:avLst/>
+              <a:gdLst>
+                <a:gd name="connsiteX0" fmla="*/ 0 w 226400"/>
+                <a:gd name="connsiteY0" fmla="*/ 32920 h 171466"/>
+                <a:gd name="connsiteX1" fmla="*/ 157018 w 226400"/>
+                <a:gd name="connsiteY1" fmla="*/ 5211 h 171466"/>
+                <a:gd name="connsiteX2" fmla="*/ 221673 w 226400"/>
+                <a:gd name="connsiteY2" fmla="*/ 125284 h 171466"/>
+                <a:gd name="connsiteX3" fmla="*/ 36945 w 226400"/>
+                <a:gd name="connsiteY3" fmla="*/ 171466 h 171466"/>
+              </a:gdLst>
+              <a:ahLst/>
+              <a:cxnLst>
+                <a:cxn ang="0">
+                  <a:pos x="connsiteX0" y="connsiteY0"/>
+                </a:cxn>
+                <a:cxn ang="0">
+                  <a:pos x="connsiteX1" y="connsiteY1"/>
+                </a:cxn>
+                <a:cxn ang="0">
+                  <a:pos x="connsiteX2" y="connsiteY2"/>
+                </a:cxn>
+                <a:cxn ang="0">
+                  <a:pos x="connsiteX3" y="connsiteY3"/>
+                </a:cxn>
+              </a:cxnLst>
+              <a:rect l="l" t="t" r="r" b="b"/>
+              <a:pathLst>
+                <a:path w="226400" h="171466">
+                  <a:moveTo>
+                    <a:pt x="0" y="32920"/>
+                  </a:moveTo>
+                  <a:cubicBezTo>
+                    <a:pt x="60036" y="11368"/>
+                    <a:pt x="120073" y="-10183"/>
+                    <a:pt x="157018" y="5211"/>
+                  </a:cubicBezTo>
+                  <a:cubicBezTo>
+                    <a:pt x="193963" y="20605"/>
+                    <a:pt x="241685" y="97575"/>
+                    <a:pt x="221673" y="125284"/>
+                  </a:cubicBezTo>
+                  <a:cubicBezTo>
+                    <a:pt x="201661" y="152993"/>
+                    <a:pt x="119303" y="162229"/>
+                    <a:pt x="36945" y="171466"/>
+                  </a:cubicBezTo>
+                </a:path>
+              </a:pathLst>
+            </a:custGeom>
+            <a:ln w="19050">
+              <a:solidFill>
+                <a:schemeClr val="accent6">
+                  <a:lumMod val="75000"/>
+                </a:schemeClr>
+              </a:solidFill>
+              <a:headEnd type="arrow" w="med" len="med"/>
+              <a:tailEnd type="none" w="med" len="med"/>
+            </a:ln>
+          </p:spPr>
+          <p:style>
+            <a:lnRef idx="1">
+              <a:schemeClr val="accent1"/>
+            </a:lnRef>
+            <a:fillRef idx="0">
+              <a:schemeClr val="accent1"/>
+            </a:fillRef>
+            <a:effectRef idx="0">
+              <a:schemeClr val="accent1"/>
+            </a:effectRef>
+            <a:fontRef idx="minor">
+              <a:schemeClr val="tx1"/>
+            </a:fontRef>
+          </p:style>
+          <p:txBody>
+            <a:bodyPr rtlCol="0" anchor="ctr"/>
+            <a:lstStyle/>
+            <a:p>
+              <a:pPr algn="ctr"/>
+              <a:endParaRPr lang="en-SG"/>
+            </a:p>
+          </p:txBody>
+        </p:sp>
+        <p:sp>
+          <p:nvSpPr>
+            <p:cNvPr id="60" name="Rectangle 59"/>
+            <p:cNvSpPr/>
+            <p:nvPr/>
+          </p:nvSpPr>
+          <p:spPr>
+            <a:xfrm>
+              <a:off x="1147403" y="5712513"/>
+              <a:ext cx="98080" cy="169591"/>
+            </a:xfrm>
+            <a:prstGeom prst="rect">
+              <a:avLst/>
+            </a:prstGeom>
+            <a:solidFill>
+              <a:schemeClr val="accent6">
+                <a:lumMod val="75000"/>
+              </a:schemeClr>
+            </a:solidFill>
+            <a:ln>
+              <a:solidFill>
+                <a:schemeClr val="bg1"/>
+              </a:solidFill>
+            </a:ln>
+            <a:effectLst/>
+          </p:spPr>
+          <p:style>
+            <a:lnRef idx="1">
+              <a:schemeClr val="accent3"/>
+            </a:lnRef>
+            <a:fillRef idx="2">
+              <a:schemeClr val="accent3"/>
+            </a:fillRef>
+            <a:effectRef idx="1">
+              <a:schemeClr val="accent3"/>
+            </a:effectRef>
+            <a:fontRef idx="minor">
+              <a:schemeClr val="dk1"/>
+            </a:fontRef>
+          </p:style>
+          <p:txBody>
+            <a:bodyPr rtlCol="0" anchor="ctr"/>
+            <a:lstStyle/>
+            <a:p>
+              <a:pPr algn="ctr"/>
+              <a:endParaRPr lang="en-SG" sz="1400">
+                <a:solidFill>
+                  <a:schemeClr val="dk1"/>
+                </a:solidFill>
+              </a:endParaRPr>
+            </a:p>
+          </p:txBody>
+        </p:sp>
+      </p:grpSp>
+      <p:sp>
+        <p:nvSpPr>
+          <p:cNvPr id="61" name="TextBox 60"/>
+          <p:cNvSpPr txBox="1"/>
+          <p:nvPr/>
+        </p:nvSpPr>
+        <p:spPr>
+          <a:xfrm>
+            <a:off x="8223953" y="5180992"/>
+            <a:ext cx="539047" cy="430887"/>
+          </a:xfrm>
+          <a:prstGeom prst="rect">
+            <a:avLst/>
+          </a:prstGeom>
+          <a:noFill/>
+        </p:spPr>
+        <p:txBody>
+          <a:bodyPr wrap="square" lIns="0" tIns="0" rIns="0" bIns="0" rtlCol="0">
+            <a:spAutoFit/>
+          </a:bodyPr>
+          <a:lstStyle/>
+          <a:p>
+            <a:r>
+              <a:rPr lang="en-US" sz="1400" dirty="0" smtClean="0">
+                <a:solidFill>
+                  <a:schemeClr val="accent6">
+                    <a:lumMod val="75000"/>
+                  </a:schemeClr>
+                </a:solidFill>
+              </a:rPr>
+              <a:t>Save </a:t>
+            </a:r>
+            <a:br>
+              <a:rPr lang="en-US" sz="1400" dirty="0" smtClean="0">
+                <a:solidFill>
+                  <a:schemeClr val="accent6">
+                    <a:lumMod val="75000"/>
+                  </a:schemeClr>
+                </a:solidFill>
+              </a:rPr>
+            </a:br>
+            <a:r>
+              <a:rPr lang="en-US" sz="1400" dirty="0" smtClean="0">
+                <a:solidFill>
+                  <a:schemeClr val="accent6">
+                    <a:lumMod val="75000"/>
+                  </a:schemeClr>
+                </a:solidFill>
+              </a:rPr>
+              <a:t>to file</a:t>
+            </a:r>
+            <a:endParaRPr lang="en-US" sz="1400" dirty="0">
+              <a:solidFill>
+                <a:schemeClr val="accent6">
+                  <a:lumMod val="75000"/>
+                </a:schemeClr>
+              </a:solidFill>
+            </a:endParaRPr>
+          </a:p>
+        </p:txBody>
+      </p:sp>
     </p:spTree>
     <p:extLst>
       <p:ext uri="{BB962C8B-B14F-4D97-AF65-F5344CB8AC3E}">

</xml_diff>

<commit_message>
Add missing dependency in Logic CD
</commit_message>
<xml_diff>
--- a/docs/diagrams/Diagrams.pptx
+++ b/docs/diagrams/Diagrams.pptx
@@ -199,7 +199,7 @@
           <a:p>
             <a:fld id="{F5CC4B3F-88C1-4FFA-B1B6-F41C21DC6924}" type="datetimeFigureOut">
               <a:rPr lang="en-US" smtClean="0"/>
-              <a:t>9/29/2016</a:t>
+              <a:t>9/30/2016</a:t>
             </a:fld>
             <a:endParaRPr lang="en-US"/>
           </a:p>
@@ -648,7 +648,7 @@
           <a:p>
             <a:fld id="{78C97017-6FC3-485B-9764-EAC9E56C1D49}" type="datetimeFigureOut">
               <a:rPr lang="en-US" smtClean="0"/>
-              <a:t>9/29/2016</a:t>
+              <a:t>9/30/2016</a:t>
             </a:fld>
             <a:endParaRPr lang="en-US"/>
           </a:p>
@@ -818,7 +818,7 @@
           <a:p>
             <a:fld id="{78C97017-6FC3-485B-9764-EAC9E56C1D49}" type="datetimeFigureOut">
               <a:rPr lang="en-US" smtClean="0"/>
-              <a:t>9/29/2016</a:t>
+              <a:t>9/30/2016</a:t>
             </a:fld>
             <a:endParaRPr lang="en-US"/>
           </a:p>
@@ -998,7 +998,7 @@
           <a:p>
             <a:fld id="{78C97017-6FC3-485B-9764-EAC9E56C1D49}" type="datetimeFigureOut">
               <a:rPr lang="en-US" smtClean="0"/>
-              <a:t>9/29/2016</a:t>
+              <a:t>9/30/2016</a:t>
             </a:fld>
             <a:endParaRPr lang="en-US"/>
           </a:p>
@@ -1168,7 +1168,7 @@
           <a:p>
             <a:fld id="{78C97017-6FC3-485B-9764-EAC9E56C1D49}" type="datetimeFigureOut">
               <a:rPr lang="en-US" smtClean="0"/>
-              <a:t>9/29/2016</a:t>
+              <a:t>9/30/2016</a:t>
             </a:fld>
             <a:endParaRPr lang="en-US"/>
           </a:p>
@@ -1414,7 +1414,7 @@
           <a:p>
             <a:fld id="{78C97017-6FC3-485B-9764-EAC9E56C1D49}" type="datetimeFigureOut">
               <a:rPr lang="en-US" smtClean="0"/>
-              <a:t>9/29/2016</a:t>
+              <a:t>9/30/2016</a:t>
             </a:fld>
             <a:endParaRPr lang="en-US"/>
           </a:p>
@@ -1702,7 +1702,7 @@
           <a:p>
             <a:fld id="{78C97017-6FC3-485B-9764-EAC9E56C1D49}" type="datetimeFigureOut">
               <a:rPr lang="en-US" smtClean="0"/>
-              <a:t>9/29/2016</a:t>
+              <a:t>9/30/2016</a:t>
             </a:fld>
             <a:endParaRPr lang="en-US"/>
           </a:p>
@@ -2124,7 +2124,7 @@
           <a:p>
             <a:fld id="{78C97017-6FC3-485B-9764-EAC9E56C1D49}" type="datetimeFigureOut">
               <a:rPr lang="en-US" smtClean="0"/>
-              <a:t>9/29/2016</a:t>
+              <a:t>9/30/2016</a:t>
             </a:fld>
             <a:endParaRPr lang="en-US"/>
           </a:p>
@@ -2242,7 +2242,7 @@
           <a:p>
             <a:fld id="{78C97017-6FC3-485B-9764-EAC9E56C1D49}" type="datetimeFigureOut">
               <a:rPr lang="en-US" smtClean="0"/>
-              <a:t>9/29/2016</a:t>
+              <a:t>9/30/2016</a:t>
             </a:fld>
             <a:endParaRPr lang="en-US"/>
           </a:p>
@@ -2337,7 +2337,7 @@
           <a:p>
             <a:fld id="{78C97017-6FC3-485B-9764-EAC9E56C1D49}" type="datetimeFigureOut">
               <a:rPr lang="en-US" smtClean="0"/>
-              <a:t>9/29/2016</a:t>
+              <a:t>9/30/2016</a:t>
             </a:fld>
             <a:endParaRPr lang="en-US"/>
           </a:p>
@@ -2614,7 +2614,7 @@
           <a:p>
             <a:fld id="{78C97017-6FC3-485B-9764-EAC9E56C1D49}" type="datetimeFigureOut">
               <a:rPr lang="en-US" smtClean="0"/>
-              <a:t>9/29/2016</a:t>
+              <a:t>9/30/2016</a:t>
             </a:fld>
             <a:endParaRPr lang="en-US"/>
           </a:p>
@@ -2867,7 +2867,7 @@
           <a:p>
             <a:fld id="{78C97017-6FC3-485B-9764-EAC9E56C1D49}" type="datetimeFigureOut">
               <a:rPr lang="en-US" smtClean="0"/>
-              <a:t>9/29/2016</a:t>
+              <a:t>9/30/2016</a:t>
             </a:fld>
             <a:endParaRPr lang="en-US"/>
           </a:p>
@@ -3080,7 +3080,7 @@
           <a:p>
             <a:fld id="{78C97017-6FC3-485B-9764-EAC9E56C1D49}" type="datetimeFigureOut">
               <a:rPr lang="en-US" smtClean="0"/>
-              <a:t>9/29/2016</a:t>
+              <a:t>9/30/2016</a:t>
             </a:fld>
             <a:endParaRPr lang="en-US"/>
           </a:p>
@@ -11472,6 +11472,47 @@
             </a:solidFill>
             <a:headEnd type="none" w="med" len="med"/>
             <a:tailEnd type="none" w="med" len="med"/>
+          </a:ln>
+          <a:effectLst/>
+        </p:spPr>
+        <p:style>
+          <a:lnRef idx="1">
+            <a:schemeClr val="accent2"/>
+          </a:lnRef>
+          <a:fillRef idx="2">
+            <a:schemeClr val="accent2"/>
+          </a:fillRef>
+          <a:effectRef idx="1">
+            <a:schemeClr val="accent2"/>
+          </a:effectRef>
+          <a:fontRef idx="minor">
+            <a:schemeClr val="dk1"/>
+          </a:fontRef>
+        </p:style>
+      </p:cxnSp>
+      <p:cxnSp>
+        <p:nvCxnSpPr>
+          <p:cNvPr id="46" name="Elbow Connector 122"/>
+          <p:cNvCxnSpPr/>
+          <p:nvPr/>
+        </p:nvCxnSpPr>
+        <p:spPr>
+          <a:xfrm rot="5400000" flipH="1" flipV="1">
+            <a:off x="1807196" y="3315772"/>
+            <a:ext cx="882304" cy="12700"/>
+          </a:xfrm>
+          <a:prstGeom prst="bentConnector3">
+            <a:avLst>
+              <a:gd name="adj1" fmla="val 50000"/>
+            </a:avLst>
+          </a:prstGeom>
+          <a:ln w="19050">
+            <a:solidFill>
+              <a:srgbClr val="0070C0"/>
+            </a:solidFill>
+            <a:prstDash val="sysDot"/>
+            <a:headEnd type="none" w="med" len="med"/>
+            <a:tailEnd type="arrow" w="med" len="med"/>
           </a:ln>
           <a:effectLst/>
         </p:spPr>

</xml_diff>

<commit_message>
Add SD for delete person within Logic
</commit_message>
<xml_diff>
--- a/docs/diagrams/Diagrams.pptx
+++ b/docs/diagrams/Diagrams.pptx
@@ -5,7 +5,7 @@
     <p:sldMasterId id="2147483648" r:id="rId1"/>
   </p:sldMasterIdLst>
   <p:notesMasterIdLst>
-    <p:notesMasterId r:id="rId10"/>
+    <p:notesMasterId r:id="rId11"/>
   </p:notesMasterIdLst>
   <p:sldIdLst>
     <p:sldId id="256" r:id="rId2"/>
@@ -13,9 +13,10 @@
     <p:sldId id="266" r:id="rId4"/>
     <p:sldId id="260" r:id="rId5"/>
     <p:sldId id="261" r:id="rId6"/>
-    <p:sldId id="263" r:id="rId7"/>
-    <p:sldId id="264" r:id="rId8"/>
-    <p:sldId id="265" r:id="rId9"/>
+    <p:sldId id="267" r:id="rId7"/>
+    <p:sldId id="263" r:id="rId8"/>
+    <p:sldId id="264" r:id="rId9"/>
+    <p:sldId id="265" r:id="rId10"/>
   </p:sldIdLst>
   <p:sldSz cx="9144000" cy="6858000" type="screen4x3"/>
   <p:notesSz cx="6858000" cy="9144000"/>
@@ -11570,6 +11571,1682 @@
       </p:grpSpPr>
       <p:sp>
         <p:nvSpPr>
+          <p:cNvPr id="81" name="Rectangle 65"/>
+          <p:cNvSpPr/>
+          <p:nvPr/>
+        </p:nvSpPr>
+        <p:spPr>
+          <a:xfrm>
+            <a:off x="685800" y="1981200"/>
+            <a:ext cx="7086600" cy="4000286"/>
+          </a:xfrm>
+          <a:prstGeom prst="roundRect">
+            <a:avLst>
+              <a:gd name="adj" fmla="val 3484"/>
+            </a:avLst>
+          </a:prstGeom>
+          <a:solidFill>
+            <a:schemeClr val="accent1">
+              <a:lumMod val="20000"/>
+              <a:lumOff val="80000"/>
+            </a:schemeClr>
+          </a:solidFill>
+          <a:ln w="19050">
+            <a:noFill/>
+          </a:ln>
+          <a:effectLst/>
+        </p:spPr>
+        <p:style>
+          <a:lnRef idx="1">
+            <a:schemeClr val="accent2"/>
+          </a:lnRef>
+          <a:fillRef idx="2">
+            <a:schemeClr val="accent2"/>
+          </a:fillRef>
+          <a:effectRef idx="1">
+            <a:schemeClr val="accent2"/>
+          </a:effectRef>
+          <a:fontRef idx="minor">
+            <a:schemeClr val="dk1"/>
+          </a:fontRef>
+        </p:style>
+        <p:txBody>
+          <a:bodyPr rtlCol="0" anchor="t"/>
+          <a:lstStyle/>
+          <a:p>
+            <a:r>
+              <a:rPr lang="en-US" sz="1200" b="1" dirty="0" smtClean="0">
+                <a:solidFill>
+                  <a:srgbClr val="0070C0"/>
+                </a:solidFill>
+              </a:rPr>
+              <a:t>Logic</a:t>
+            </a:r>
+            <a:endParaRPr lang="en-SG" sz="1200" b="1" dirty="0">
+              <a:solidFill>
+                <a:srgbClr val="0070C0"/>
+              </a:solidFill>
+            </a:endParaRPr>
+          </a:p>
+        </p:txBody>
+      </p:sp>
+      <p:sp>
+        <p:nvSpPr>
+          <p:cNvPr id="2" name="Rectangle 62"/>
+          <p:cNvSpPr/>
+          <p:nvPr/>
+        </p:nvSpPr>
+        <p:spPr>
+          <a:xfrm>
+            <a:off x="1007063" y="2296546"/>
+            <a:ext cx="1455629" cy="346760"/>
+          </a:xfrm>
+          <a:prstGeom prst="rect">
+            <a:avLst/>
+          </a:prstGeom>
+          <a:solidFill>
+            <a:srgbClr val="0070C0"/>
+          </a:solidFill>
+          <a:ln w="19050">
+            <a:solidFill>
+              <a:srgbClr val="0070C0"/>
+            </a:solidFill>
+          </a:ln>
+          <a:effectLst/>
+        </p:spPr>
+        <p:style>
+          <a:lnRef idx="1">
+            <a:schemeClr val="accent2"/>
+          </a:lnRef>
+          <a:fillRef idx="2">
+            <a:schemeClr val="accent2"/>
+          </a:fillRef>
+          <a:effectRef idx="1">
+            <a:schemeClr val="accent2"/>
+          </a:effectRef>
+          <a:fontRef idx="minor">
+            <a:schemeClr val="dk1"/>
+          </a:fontRef>
+        </p:style>
+        <p:txBody>
+          <a:bodyPr rtlCol="0" anchor="ctr"/>
+          <a:lstStyle/>
+          <a:p>
+            <a:pPr algn="ctr"/>
+            <a:r>
+              <a:rPr lang="en-US" sz="1600" dirty="0">
+                <a:solidFill>
+                  <a:schemeClr val="bg1"/>
+                </a:solidFill>
+              </a:rPr>
+              <a:t>:</a:t>
+            </a:r>
+            <a:r>
+              <a:rPr lang="en-US" sz="1600" dirty="0" err="1">
+                <a:solidFill>
+                  <a:schemeClr val="bg1"/>
+                </a:solidFill>
+              </a:rPr>
+              <a:t>LogicManager</a:t>
+            </a:r>
+            <a:endParaRPr lang="en-SG" sz="1600" dirty="0">
+              <a:solidFill>
+                <a:schemeClr val="bg1"/>
+              </a:solidFill>
+            </a:endParaRPr>
+          </a:p>
+        </p:txBody>
+      </p:sp>
+      <p:cxnSp>
+        <p:nvCxnSpPr>
+          <p:cNvPr id="5" name="Straight Connector 4"/>
+          <p:cNvCxnSpPr/>
+          <p:nvPr/>
+        </p:nvCxnSpPr>
+        <p:spPr>
+          <a:xfrm>
+            <a:off x="1734877" y="2660217"/>
+            <a:ext cx="0" cy="2597583"/>
+          </a:xfrm>
+          <a:prstGeom prst="line">
+            <a:avLst/>
+          </a:prstGeom>
+          <a:ln w="19050">
+            <a:solidFill>
+              <a:srgbClr val="0070C0"/>
+            </a:solidFill>
+            <a:prstDash val="sysDash"/>
+          </a:ln>
+          <a:effectLst/>
+        </p:spPr>
+        <p:style>
+          <a:lnRef idx="1">
+            <a:schemeClr val="accent1"/>
+          </a:lnRef>
+          <a:fillRef idx="2">
+            <a:schemeClr val="accent1"/>
+          </a:fillRef>
+          <a:effectRef idx="1">
+            <a:schemeClr val="accent1"/>
+          </a:effectRef>
+          <a:fontRef idx="minor">
+            <a:schemeClr val="dk1"/>
+          </a:fontRef>
+        </p:style>
+      </p:cxnSp>
+      <p:sp>
+        <p:nvSpPr>
+          <p:cNvPr id="6" name="Rectangle 5"/>
+          <p:cNvSpPr/>
+          <p:nvPr/>
+        </p:nvSpPr>
+        <p:spPr>
+          <a:xfrm>
+            <a:off x="1662869" y="3010911"/>
+            <a:ext cx="152400" cy="2780287"/>
+          </a:xfrm>
+          <a:prstGeom prst="rect">
+            <a:avLst/>
+          </a:prstGeom>
+          <a:solidFill>
+            <a:srgbClr val="0070C0"/>
+          </a:solidFill>
+          <a:ln>
+            <a:solidFill>
+              <a:srgbClr val="0070C0"/>
+            </a:solidFill>
+          </a:ln>
+          <a:effectLst/>
+        </p:spPr>
+        <p:style>
+          <a:lnRef idx="1">
+            <a:schemeClr val="accent3"/>
+          </a:lnRef>
+          <a:fillRef idx="2">
+            <a:schemeClr val="accent3"/>
+          </a:fillRef>
+          <a:effectRef idx="1">
+            <a:schemeClr val="accent3"/>
+          </a:effectRef>
+          <a:fontRef idx="minor">
+            <a:schemeClr val="dk1"/>
+          </a:fontRef>
+        </p:style>
+        <p:txBody>
+          <a:bodyPr rtlCol="0" anchor="ctr"/>
+          <a:lstStyle/>
+          <a:p>
+            <a:pPr algn="ctr"/>
+            <a:endParaRPr lang="en-SG" sz="1400"/>
+          </a:p>
+        </p:txBody>
+      </p:sp>
+      <p:sp>
+        <p:nvSpPr>
+          <p:cNvPr id="16" name="Rectangle 62"/>
+          <p:cNvSpPr/>
+          <p:nvPr/>
+        </p:nvSpPr>
+        <p:spPr>
+          <a:xfrm>
+            <a:off x="3411783" y="2300233"/>
+            <a:ext cx="1093635" cy="346760"/>
+          </a:xfrm>
+          <a:prstGeom prst="rect">
+            <a:avLst/>
+          </a:prstGeom>
+          <a:solidFill>
+            <a:srgbClr val="0070C0"/>
+          </a:solidFill>
+          <a:ln w="19050">
+            <a:solidFill>
+              <a:srgbClr val="0070C0"/>
+            </a:solidFill>
+          </a:ln>
+          <a:effectLst/>
+        </p:spPr>
+        <p:style>
+          <a:lnRef idx="1">
+            <a:schemeClr val="accent2"/>
+          </a:lnRef>
+          <a:fillRef idx="2">
+            <a:schemeClr val="accent2"/>
+          </a:fillRef>
+          <a:effectRef idx="1">
+            <a:schemeClr val="accent2"/>
+          </a:effectRef>
+          <a:fontRef idx="minor">
+            <a:schemeClr val="dk1"/>
+          </a:fontRef>
+        </p:style>
+        <p:txBody>
+          <a:bodyPr rtlCol="0" anchor="ctr"/>
+          <a:lstStyle/>
+          <a:p>
+            <a:pPr algn="ctr"/>
+            <a:r>
+              <a:rPr lang="en-US" sz="1600" dirty="0" smtClean="0">
+                <a:solidFill>
+                  <a:schemeClr val="bg1"/>
+                </a:solidFill>
+              </a:rPr>
+              <a:t>:Parser</a:t>
+            </a:r>
+            <a:endParaRPr lang="en-SG" sz="1600" dirty="0">
+              <a:solidFill>
+                <a:schemeClr val="bg1"/>
+              </a:solidFill>
+            </a:endParaRPr>
+          </a:p>
+        </p:txBody>
+      </p:sp>
+      <p:cxnSp>
+        <p:nvCxnSpPr>
+          <p:cNvPr id="17" name="Straight Connector 16"/>
+          <p:cNvCxnSpPr/>
+          <p:nvPr/>
+        </p:nvCxnSpPr>
+        <p:spPr>
+          <a:xfrm>
+            <a:off x="3958600" y="2663904"/>
+            <a:ext cx="0" cy="1587652"/>
+          </a:xfrm>
+          <a:prstGeom prst="line">
+            <a:avLst/>
+          </a:prstGeom>
+          <a:ln w="19050">
+            <a:solidFill>
+              <a:srgbClr val="0070C0"/>
+            </a:solidFill>
+            <a:prstDash val="sysDash"/>
+          </a:ln>
+          <a:effectLst/>
+        </p:spPr>
+        <p:style>
+          <a:lnRef idx="1">
+            <a:schemeClr val="accent1"/>
+          </a:lnRef>
+          <a:fillRef idx="2">
+            <a:schemeClr val="accent1"/>
+          </a:fillRef>
+          <a:effectRef idx="1">
+            <a:schemeClr val="accent1"/>
+          </a:effectRef>
+          <a:fontRef idx="minor">
+            <a:schemeClr val="dk1"/>
+          </a:fontRef>
+        </p:style>
+      </p:cxnSp>
+      <p:sp>
+        <p:nvSpPr>
+          <p:cNvPr id="18" name="Rectangle 17"/>
+          <p:cNvSpPr/>
+          <p:nvPr/>
+        </p:nvSpPr>
+        <p:spPr>
+          <a:xfrm>
+            <a:off x="3886592" y="3122097"/>
+            <a:ext cx="144016" cy="832525"/>
+          </a:xfrm>
+          <a:prstGeom prst="rect">
+            <a:avLst/>
+          </a:prstGeom>
+          <a:solidFill>
+            <a:srgbClr val="0070C0"/>
+          </a:solidFill>
+          <a:ln>
+            <a:solidFill>
+              <a:srgbClr val="0070C0"/>
+            </a:solidFill>
+          </a:ln>
+          <a:effectLst/>
+        </p:spPr>
+        <p:style>
+          <a:lnRef idx="1">
+            <a:schemeClr val="accent3"/>
+          </a:lnRef>
+          <a:fillRef idx="2">
+            <a:schemeClr val="accent3"/>
+          </a:fillRef>
+          <a:effectRef idx="1">
+            <a:schemeClr val="accent3"/>
+          </a:effectRef>
+          <a:fontRef idx="minor">
+            <a:schemeClr val="dk1"/>
+          </a:fontRef>
+        </p:style>
+        <p:txBody>
+          <a:bodyPr rtlCol="0" anchor="ctr"/>
+          <a:lstStyle/>
+          <a:p>
+            <a:pPr algn="ctr"/>
+            <a:endParaRPr lang="en-SG" sz="1400">
+              <a:solidFill>
+                <a:schemeClr val="dk1"/>
+              </a:solidFill>
+            </a:endParaRPr>
+          </a:p>
+        </p:txBody>
+      </p:sp>
+      <p:sp>
+        <p:nvSpPr>
+          <p:cNvPr id="19" name="Rectangle 62"/>
+          <p:cNvSpPr/>
+          <p:nvPr/>
+        </p:nvSpPr>
+        <p:spPr>
+          <a:xfrm>
+            <a:off x="4953000" y="2996259"/>
+            <a:ext cx="1093635" cy="461538"/>
+          </a:xfrm>
+          <a:prstGeom prst="rect">
+            <a:avLst/>
+          </a:prstGeom>
+          <a:solidFill>
+            <a:srgbClr val="0070C0"/>
+          </a:solidFill>
+          <a:ln w="19050">
+            <a:solidFill>
+              <a:srgbClr val="0070C0"/>
+            </a:solidFill>
+          </a:ln>
+          <a:effectLst/>
+        </p:spPr>
+        <p:style>
+          <a:lnRef idx="1">
+            <a:schemeClr val="accent2"/>
+          </a:lnRef>
+          <a:fillRef idx="2">
+            <a:schemeClr val="accent2"/>
+          </a:fillRef>
+          <a:effectRef idx="1">
+            <a:schemeClr val="accent2"/>
+          </a:effectRef>
+          <a:fontRef idx="minor">
+            <a:schemeClr val="dk1"/>
+          </a:fontRef>
+        </p:style>
+        <p:txBody>
+          <a:bodyPr rtlCol="0" anchor="ctr"/>
+          <a:lstStyle/>
+          <a:p>
+            <a:pPr algn="ctr"/>
+            <a:r>
+              <a:rPr lang="en-US" sz="1600" dirty="0" smtClean="0">
+                <a:solidFill>
+                  <a:schemeClr val="bg1"/>
+                </a:solidFill>
+              </a:rPr>
+              <a:t>d:Delete</a:t>
+            </a:r>
+            <a:r>
+              <a:rPr lang="en-US" sz="1600" dirty="0">
+                <a:solidFill>
+                  <a:schemeClr val="bg1"/>
+                </a:solidFill>
+              </a:rPr>
+              <a:t/>
+            </a:r>
+            <a:br>
+              <a:rPr lang="en-US" sz="1600" dirty="0">
+                <a:solidFill>
+                  <a:schemeClr val="bg1"/>
+                </a:solidFill>
+              </a:rPr>
+            </a:br>
+            <a:r>
+              <a:rPr lang="en-US" sz="1600" dirty="0">
+                <a:solidFill>
+                  <a:schemeClr val="bg1"/>
+                </a:solidFill>
+              </a:rPr>
+              <a:t>Command</a:t>
+            </a:r>
+            <a:endParaRPr lang="en-SG" sz="1600" dirty="0">
+              <a:solidFill>
+                <a:schemeClr val="bg1"/>
+              </a:solidFill>
+            </a:endParaRPr>
+          </a:p>
+        </p:txBody>
+      </p:sp>
+      <p:cxnSp>
+        <p:nvCxnSpPr>
+          <p:cNvPr id="20" name="Straight Connector 19"/>
+          <p:cNvCxnSpPr/>
+          <p:nvPr/>
+        </p:nvCxnSpPr>
+        <p:spPr>
+          <a:xfrm>
+            <a:off x="5499817" y="3417319"/>
+            <a:ext cx="0" cy="2450081"/>
+          </a:xfrm>
+          <a:prstGeom prst="line">
+            <a:avLst/>
+          </a:prstGeom>
+          <a:ln w="19050">
+            <a:solidFill>
+              <a:srgbClr val="0070C0"/>
+            </a:solidFill>
+            <a:prstDash val="sysDash"/>
+          </a:ln>
+          <a:effectLst/>
+        </p:spPr>
+        <p:style>
+          <a:lnRef idx="1">
+            <a:schemeClr val="accent1"/>
+          </a:lnRef>
+          <a:fillRef idx="2">
+            <a:schemeClr val="accent1"/>
+          </a:fillRef>
+          <a:effectRef idx="1">
+            <a:schemeClr val="accent1"/>
+          </a:effectRef>
+          <a:fontRef idx="minor">
+            <a:schemeClr val="dk1"/>
+          </a:fontRef>
+        </p:style>
+      </p:cxnSp>
+      <p:sp>
+        <p:nvSpPr>
+          <p:cNvPr id="21" name="Rectangle 20"/>
+          <p:cNvSpPr/>
+          <p:nvPr/>
+        </p:nvSpPr>
+        <p:spPr>
+          <a:xfrm>
+            <a:off x="5427809" y="3457797"/>
+            <a:ext cx="152400" cy="276003"/>
+          </a:xfrm>
+          <a:prstGeom prst="rect">
+            <a:avLst/>
+          </a:prstGeom>
+          <a:solidFill>
+            <a:srgbClr val="0070C0"/>
+          </a:solidFill>
+          <a:ln>
+            <a:solidFill>
+              <a:srgbClr val="0070C0"/>
+            </a:solidFill>
+          </a:ln>
+          <a:effectLst/>
+        </p:spPr>
+        <p:style>
+          <a:lnRef idx="1">
+            <a:schemeClr val="accent3"/>
+          </a:lnRef>
+          <a:fillRef idx="2">
+            <a:schemeClr val="accent3"/>
+          </a:fillRef>
+          <a:effectRef idx="1">
+            <a:schemeClr val="accent3"/>
+          </a:effectRef>
+          <a:fontRef idx="minor">
+            <a:schemeClr val="dk1"/>
+          </a:fontRef>
+        </p:style>
+        <p:txBody>
+          <a:bodyPr rtlCol="0" anchor="ctr"/>
+          <a:lstStyle/>
+          <a:p>
+            <a:pPr algn="ctr"/>
+            <a:endParaRPr lang="en-SG" sz="1400"/>
+          </a:p>
+        </p:txBody>
+      </p:sp>
+      <p:cxnSp>
+        <p:nvCxnSpPr>
+          <p:cNvPr id="23" name="Straight Arrow Connector 22"/>
+          <p:cNvCxnSpPr/>
+          <p:nvPr/>
+        </p:nvCxnSpPr>
+        <p:spPr>
+          <a:xfrm>
+            <a:off x="543018" y="3014599"/>
+            <a:ext cx="1119851" cy="0"/>
+          </a:xfrm>
+          <a:prstGeom prst="straightConnector1">
+            <a:avLst/>
+          </a:prstGeom>
+          <a:ln w="19050">
+            <a:solidFill>
+              <a:srgbClr val="00B050"/>
+            </a:solidFill>
+            <a:tailEnd type="arrow"/>
+          </a:ln>
+        </p:spPr>
+        <p:style>
+          <a:lnRef idx="1">
+            <a:schemeClr val="accent1"/>
+          </a:lnRef>
+          <a:fillRef idx="0">
+            <a:schemeClr val="accent1"/>
+          </a:fillRef>
+          <a:effectRef idx="0">
+            <a:schemeClr val="accent1"/>
+          </a:effectRef>
+          <a:fontRef idx="minor">
+            <a:schemeClr val="tx1"/>
+          </a:fontRef>
+        </p:style>
+      </p:cxnSp>
+      <p:cxnSp>
+        <p:nvCxnSpPr>
+          <p:cNvPr id="25" name="Straight Arrow Connector 24"/>
+          <p:cNvCxnSpPr/>
+          <p:nvPr/>
+        </p:nvCxnSpPr>
+        <p:spPr>
+          <a:xfrm>
+            <a:off x="1815269" y="3122098"/>
+            <a:ext cx="2071323" cy="0"/>
+          </a:xfrm>
+          <a:prstGeom prst="straightConnector1">
+            <a:avLst/>
+          </a:prstGeom>
+          <a:ln w="19050">
+            <a:solidFill>
+              <a:srgbClr val="0070C0"/>
+            </a:solidFill>
+            <a:tailEnd type="arrow"/>
+          </a:ln>
+        </p:spPr>
+        <p:style>
+          <a:lnRef idx="1">
+            <a:schemeClr val="accent1"/>
+          </a:lnRef>
+          <a:fillRef idx="0">
+            <a:schemeClr val="accent1"/>
+          </a:fillRef>
+          <a:effectRef idx="0">
+            <a:schemeClr val="accent1"/>
+          </a:effectRef>
+          <a:fontRef idx="minor">
+            <a:schemeClr val="tx1"/>
+          </a:fontRef>
+        </p:style>
+      </p:cxnSp>
+      <p:sp>
+        <p:nvSpPr>
+          <p:cNvPr id="26" name="TextBox 25"/>
+          <p:cNvSpPr txBox="1"/>
+          <p:nvPr/>
+        </p:nvSpPr>
+        <p:spPr>
+          <a:xfrm>
+            <a:off x="152400" y="2743200"/>
+            <a:ext cx="1424846" cy="215444"/>
+          </a:xfrm>
+          <a:prstGeom prst="rect">
+            <a:avLst/>
+          </a:prstGeom>
+          <a:noFill/>
+        </p:spPr>
+        <p:txBody>
+          <a:bodyPr wrap="square" lIns="0" tIns="0" rIns="0" bIns="0" rtlCol="0">
+            <a:spAutoFit/>
+          </a:bodyPr>
+          <a:lstStyle/>
+          <a:p>
+            <a:pPr algn="r"/>
+            <a:r>
+              <a:rPr lang="en-US" sz="1400" dirty="0" smtClean="0">
+                <a:solidFill>
+                  <a:srgbClr val="0070C0"/>
+                </a:solidFill>
+              </a:rPr>
+              <a:t>execute(“delete 1”)</a:t>
+            </a:r>
+            <a:endParaRPr lang="en-US" sz="1400" dirty="0">
+              <a:solidFill>
+                <a:srgbClr val="0070C0"/>
+              </a:solidFill>
+            </a:endParaRPr>
+          </a:p>
+        </p:txBody>
+      </p:sp>
+      <p:cxnSp>
+        <p:nvCxnSpPr>
+          <p:cNvPr id="28" name="Straight Arrow Connector 27"/>
+          <p:cNvCxnSpPr>
+            <a:endCxn id="19" idx="1"/>
+          </p:cNvCxnSpPr>
+          <p:nvPr/>
+        </p:nvCxnSpPr>
+        <p:spPr>
+          <a:xfrm flipV="1">
+            <a:off x="4030608" y="3227028"/>
+            <a:ext cx="922392" cy="1"/>
+          </a:xfrm>
+          <a:prstGeom prst="straightConnector1">
+            <a:avLst/>
+          </a:prstGeom>
+          <a:ln w="19050">
+            <a:solidFill>
+              <a:srgbClr val="0070C0"/>
+            </a:solidFill>
+            <a:tailEnd type="arrow"/>
+          </a:ln>
+        </p:spPr>
+        <p:style>
+          <a:lnRef idx="1">
+            <a:schemeClr val="accent1"/>
+          </a:lnRef>
+          <a:fillRef idx="0">
+            <a:schemeClr val="accent1"/>
+          </a:fillRef>
+          <a:effectRef idx="0">
+            <a:schemeClr val="accent1"/>
+          </a:effectRef>
+          <a:fontRef idx="minor">
+            <a:schemeClr val="tx1"/>
+          </a:fontRef>
+        </p:style>
+      </p:cxnSp>
+      <p:sp>
+        <p:nvSpPr>
+          <p:cNvPr id="29" name="TextBox 28"/>
+          <p:cNvSpPr txBox="1"/>
+          <p:nvPr/>
+        </p:nvSpPr>
+        <p:spPr>
+          <a:xfrm>
+            <a:off x="4419600" y="4251556"/>
+            <a:ext cx="855809" cy="215444"/>
+          </a:xfrm>
+          <a:prstGeom prst="rect">
+            <a:avLst/>
+          </a:prstGeom>
+          <a:noFill/>
+        </p:spPr>
+        <p:txBody>
+          <a:bodyPr wrap="square" lIns="0" tIns="0" rIns="0" bIns="0" rtlCol="0">
+            <a:spAutoFit/>
+          </a:bodyPr>
+          <a:lstStyle>
+            <a:defPPr>
+              <a:defRPr lang="en-US"/>
+            </a:defPPr>
+            <a:lvl1pPr algn="r">
+              <a:defRPr sz="1400">
+                <a:solidFill>
+                  <a:srgbClr val="0070C0"/>
+                </a:solidFill>
+              </a:defRPr>
+            </a:lvl1pPr>
+          </a:lstStyle>
+          <a:p>
+            <a:r>
+              <a:rPr lang="en-US" dirty="0"/>
+              <a:t>execute()</a:t>
+            </a:r>
+            <a:endParaRPr lang="en-US" dirty="0"/>
+          </a:p>
+        </p:txBody>
+      </p:sp>
+      <p:cxnSp>
+        <p:nvCxnSpPr>
+          <p:cNvPr id="34" name="Straight Arrow Connector 33"/>
+          <p:cNvCxnSpPr/>
+          <p:nvPr/>
+        </p:nvCxnSpPr>
+        <p:spPr>
+          <a:xfrm>
+            <a:off x="4030608" y="3733800"/>
+            <a:ext cx="1406215" cy="0"/>
+          </a:xfrm>
+          <a:prstGeom prst="straightConnector1">
+            <a:avLst/>
+          </a:prstGeom>
+          <a:ln w="19050">
+            <a:solidFill>
+              <a:srgbClr val="0070C0"/>
+            </a:solidFill>
+            <a:prstDash val="sysDash"/>
+            <a:headEnd type="arrow" w="med" len="med"/>
+            <a:tailEnd type="none" w="med" len="med"/>
+          </a:ln>
+        </p:spPr>
+        <p:style>
+          <a:lnRef idx="1">
+            <a:schemeClr val="accent1"/>
+          </a:lnRef>
+          <a:fillRef idx="0">
+            <a:schemeClr val="accent1"/>
+          </a:fillRef>
+          <a:effectRef idx="0">
+            <a:schemeClr val="accent1"/>
+          </a:effectRef>
+          <a:fontRef idx="minor">
+            <a:schemeClr val="tx1"/>
+          </a:fontRef>
+        </p:style>
+      </p:cxnSp>
+      <p:cxnSp>
+        <p:nvCxnSpPr>
+          <p:cNvPr id="35" name="Straight Arrow Connector 34"/>
+          <p:cNvCxnSpPr/>
+          <p:nvPr/>
+        </p:nvCxnSpPr>
+        <p:spPr>
+          <a:xfrm>
+            <a:off x="1815269" y="3954622"/>
+            <a:ext cx="2058118" cy="0"/>
+          </a:xfrm>
+          <a:prstGeom prst="straightConnector1">
+            <a:avLst/>
+          </a:prstGeom>
+          <a:ln w="19050">
+            <a:solidFill>
+              <a:srgbClr val="0070C0"/>
+            </a:solidFill>
+            <a:prstDash val="sysDash"/>
+            <a:headEnd type="arrow" w="med" len="med"/>
+            <a:tailEnd type="none" w="med" len="med"/>
+          </a:ln>
+        </p:spPr>
+        <p:style>
+          <a:lnRef idx="1">
+            <a:schemeClr val="accent1"/>
+          </a:lnRef>
+          <a:fillRef idx="0">
+            <a:schemeClr val="accent1"/>
+          </a:fillRef>
+          <a:effectRef idx="0">
+            <a:schemeClr val="accent1"/>
+          </a:effectRef>
+          <a:fontRef idx="minor">
+            <a:schemeClr val="tx1"/>
+          </a:fontRef>
+        </p:style>
+      </p:cxnSp>
+      <p:cxnSp>
+        <p:nvCxnSpPr>
+          <p:cNvPr id="37" name="Straight Arrow Connector 36"/>
+          <p:cNvCxnSpPr/>
+          <p:nvPr/>
+        </p:nvCxnSpPr>
+        <p:spPr>
+          <a:xfrm>
+            <a:off x="466818" y="5791200"/>
+            <a:ext cx="1196051" cy="0"/>
+          </a:xfrm>
+          <a:prstGeom prst="straightConnector1">
+            <a:avLst/>
+          </a:prstGeom>
+          <a:ln w="19050">
+            <a:solidFill>
+              <a:schemeClr val="accent1"/>
+            </a:solidFill>
+            <a:prstDash val="sysDash"/>
+            <a:headEnd type="arrow" w="med" len="med"/>
+            <a:tailEnd type="none" w="med" len="med"/>
+          </a:ln>
+        </p:spPr>
+        <p:style>
+          <a:lnRef idx="1">
+            <a:schemeClr val="accent1"/>
+          </a:lnRef>
+          <a:fillRef idx="0">
+            <a:schemeClr val="accent1"/>
+          </a:fillRef>
+          <a:effectRef idx="0">
+            <a:schemeClr val="accent1"/>
+          </a:effectRef>
+          <a:fontRef idx="minor">
+            <a:schemeClr val="tx1"/>
+          </a:fontRef>
+        </p:style>
+      </p:cxnSp>
+      <p:sp>
+        <p:nvSpPr>
+          <p:cNvPr id="39" name="Rectangle 62"/>
+          <p:cNvSpPr/>
+          <p:nvPr/>
+        </p:nvSpPr>
+        <p:spPr>
+          <a:xfrm>
+            <a:off x="7938756" y="2317144"/>
+            <a:ext cx="1030504" cy="346760"/>
+          </a:xfrm>
+          <a:prstGeom prst="rect">
+            <a:avLst/>
+          </a:prstGeom>
+          <a:solidFill>
+            <a:schemeClr val="accent4">
+              <a:lumMod val="60000"/>
+              <a:lumOff val="40000"/>
+            </a:schemeClr>
+          </a:solidFill>
+          <a:ln w="19050">
+            <a:solidFill>
+              <a:schemeClr val="accent4">
+                <a:lumMod val="60000"/>
+                <a:lumOff val="40000"/>
+              </a:schemeClr>
+            </a:solidFill>
+          </a:ln>
+          <a:effectLst/>
+        </p:spPr>
+        <p:style>
+          <a:lnRef idx="1">
+            <a:schemeClr val="accent2"/>
+          </a:lnRef>
+          <a:fillRef idx="2">
+            <a:schemeClr val="accent2"/>
+          </a:fillRef>
+          <a:effectRef idx="1">
+            <a:schemeClr val="accent2"/>
+          </a:effectRef>
+          <a:fontRef idx="minor">
+            <a:schemeClr val="dk1"/>
+          </a:fontRef>
+        </p:style>
+        <p:txBody>
+          <a:bodyPr rtlCol="0" anchor="ctr"/>
+          <a:lstStyle/>
+          <a:p>
+            <a:pPr algn="ctr"/>
+            <a:r>
+              <a:rPr lang="en-US" sz="1600" dirty="0">
+                <a:solidFill>
+                  <a:schemeClr val="bg1"/>
+                </a:solidFill>
+              </a:rPr>
+              <a:t>:Model</a:t>
+            </a:r>
+            <a:endParaRPr lang="en-SG" sz="1600" dirty="0">
+              <a:solidFill>
+                <a:schemeClr val="bg1"/>
+              </a:solidFill>
+            </a:endParaRPr>
+          </a:p>
+        </p:txBody>
+      </p:sp>
+      <p:cxnSp>
+        <p:nvCxnSpPr>
+          <p:cNvPr id="64" name="Straight Arrow Connector 63"/>
+          <p:cNvCxnSpPr/>
+          <p:nvPr/>
+        </p:nvCxnSpPr>
+        <p:spPr>
+          <a:xfrm>
+            <a:off x="1815269" y="4495317"/>
+            <a:ext cx="3612540" cy="0"/>
+          </a:xfrm>
+          <a:prstGeom prst="straightConnector1">
+            <a:avLst/>
+          </a:prstGeom>
+          <a:ln w="19050">
+            <a:solidFill>
+              <a:srgbClr val="0070C0"/>
+            </a:solidFill>
+            <a:tailEnd type="arrow"/>
+          </a:ln>
+        </p:spPr>
+        <p:style>
+          <a:lnRef idx="1">
+            <a:schemeClr val="accent1"/>
+          </a:lnRef>
+          <a:fillRef idx="0">
+            <a:schemeClr val="accent1"/>
+          </a:fillRef>
+          <a:effectRef idx="0">
+            <a:schemeClr val="accent1"/>
+          </a:effectRef>
+          <a:fontRef idx="minor">
+            <a:schemeClr val="tx1"/>
+          </a:fontRef>
+        </p:style>
+      </p:cxnSp>
+      <p:sp>
+        <p:nvSpPr>
+          <p:cNvPr id="65" name="Rectangle 64"/>
+          <p:cNvSpPr/>
+          <p:nvPr/>
+        </p:nvSpPr>
+        <p:spPr>
+          <a:xfrm>
+            <a:off x="5427809" y="4495317"/>
+            <a:ext cx="152400" cy="1191256"/>
+          </a:xfrm>
+          <a:prstGeom prst="rect">
+            <a:avLst/>
+          </a:prstGeom>
+          <a:solidFill>
+            <a:srgbClr val="0070C0"/>
+          </a:solidFill>
+          <a:ln>
+            <a:solidFill>
+              <a:srgbClr val="0070C0"/>
+            </a:solidFill>
+          </a:ln>
+          <a:effectLst/>
+        </p:spPr>
+        <p:style>
+          <a:lnRef idx="1">
+            <a:schemeClr val="accent3"/>
+          </a:lnRef>
+          <a:fillRef idx="2">
+            <a:schemeClr val="accent3"/>
+          </a:fillRef>
+          <a:effectRef idx="1">
+            <a:schemeClr val="accent3"/>
+          </a:effectRef>
+          <a:fontRef idx="minor">
+            <a:schemeClr val="dk1"/>
+          </a:fontRef>
+        </p:style>
+        <p:txBody>
+          <a:bodyPr rtlCol="0" anchor="ctr"/>
+          <a:lstStyle/>
+          <a:p>
+            <a:pPr algn="ctr"/>
+            <a:endParaRPr lang="en-SG" sz="1400"/>
+          </a:p>
+        </p:txBody>
+      </p:sp>
+      <p:cxnSp>
+        <p:nvCxnSpPr>
+          <p:cNvPr id="71" name="Straight Connector 70"/>
+          <p:cNvCxnSpPr/>
+          <p:nvPr/>
+        </p:nvCxnSpPr>
+        <p:spPr>
+          <a:xfrm>
+            <a:off x="8454008" y="2655802"/>
+            <a:ext cx="0" cy="2830598"/>
+          </a:xfrm>
+          <a:prstGeom prst="line">
+            <a:avLst/>
+          </a:prstGeom>
+          <a:ln w="19050">
+            <a:solidFill>
+              <a:schemeClr val="accent4">
+                <a:lumMod val="60000"/>
+                <a:lumOff val="40000"/>
+              </a:schemeClr>
+            </a:solidFill>
+            <a:prstDash val="sysDash"/>
+          </a:ln>
+          <a:effectLst/>
+        </p:spPr>
+        <p:style>
+          <a:lnRef idx="1">
+            <a:schemeClr val="accent1"/>
+          </a:lnRef>
+          <a:fillRef idx="2">
+            <a:schemeClr val="accent1"/>
+          </a:fillRef>
+          <a:effectRef idx="1">
+            <a:schemeClr val="accent1"/>
+          </a:effectRef>
+          <a:fontRef idx="minor">
+            <a:schemeClr val="dk1"/>
+          </a:fontRef>
+        </p:style>
+      </p:cxnSp>
+      <p:sp>
+        <p:nvSpPr>
+          <p:cNvPr id="73" name="Rectangle 72"/>
+          <p:cNvSpPr/>
+          <p:nvPr/>
+        </p:nvSpPr>
+        <p:spPr>
+          <a:xfrm>
+            <a:off x="8382000" y="4524597"/>
+            <a:ext cx="152400" cy="276003"/>
+          </a:xfrm>
+          <a:prstGeom prst="rect">
+            <a:avLst/>
+          </a:prstGeom>
+          <a:solidFill>
+            <a:schemeClr val="accent4">
+              <a:lumMod val="60000"/>
+              <a:lumOff val="40000"/>
+            </a:schemeClr>
+          </a:solidFill>
+          <a:ln>
+            <a:solidFill>
+              <a:schemeClr val="accent4">
+                <a:lumMod val="60000"/>
+                <a:lumOff val="40000"/>
+              </a:schemeClr>
+            </a:solidFill>
+          </a:ln>
+          <a:effectLst/>
+        </p:spPr>
+        <p:style>
+          <a:lnRef idx="1">
+            <a:schemeClr val="accent3"/>
+          </a:lnRef>
+          <a:fillRef idx="2">
+            <a:schemeClr val="accent3"/>
+          </a:fillRef>
+          <a:effectRef idx="1">
+            <a:schemeClr val="accent3"/>
+          </a:effectRef>
+          <a:fontRef idx="minor">
+            <a:schemeClr val="dk1"/>
+          </a:fontRef>
+        </p:style>
+        <p:txBody>
+          <a:bodyPr rtlCol="0" anchor="ctr"/>
+          <a:lstStyle/>
+          <a:p>
+            <a:pPr algn="ctr"/>
+            <a:endParaRPr lang="en-SG" sz="1400">
+              <a:solidFill>
+                <a:schemeClr val="dk1"/>
+              </a:solidFill>
+            </a:endParaRPr>
+          </a:p>
+        </p:txBody>
+      </p:sp>
+      <p:cxnSp>
+        <p:nvCxnSpPr>
+          <p:cNvPr id="75" name="Straight Arrow Connector 74"/>
+          <p:cNvCxnSpPr/>
+          <p:nvPr/>
+        </p:nvCxnSpPr>
+        <p:spPr>
+          <a:xfrm>
+            <a:off x="5580209" y="4542759"/>
+            <a:ext cx="2787374" cy="0"/>
+          </a:xfrm>
+          <a:prstGeom prst="straightConnector1">
+            <a:avLst/>
+          </a:prstGeom>
+          <a:ln w="19050">
+            <a:solidFill>
+              <a:srgbClr val="0070C0"/>
+            </a:solidFill>
+            <a:tailEnd type="arrow"/>
+          </a:ln>
+        </p:spPr>
+        <p:style>
+          <a:lnRef idx="1">
+            <a:schemeClr val="accent1"/>
+          </a:lnRef>
+          <a:fillRef idx="0">
+            <a:schemeClr val="accent1"/>
+          </a:fillRef>
+          <a:effectRef idx="0">
+            <a:schemeClr val="accent1"/>
+          </a:effectRef>
+          <a:fontRef idx="minor">
+            <a:schemeClr val="tx1"/>
+          </a:fontRef>
+        </p:style>
+      </p:cxnSp>
+      <p:cxnSp>
+        <p:nvCxnSpPr>
+          <p:cNvPr id="76" name="Straight Arrow Connector 75"/>
+          <p:cNvCxnSpPr/>
+          <p:nvPr/>
+        </p:nvCxnSpPr>
+        <p:spPr>
+          <a:xfrm>
+            <a:off x="5580209" y="4800600"/>
+            <a:ext cx="2873799" cy="0"/>
+          </a:xfrm>
+          <a:prstGeom prst="straightConnector1">
+            <a:avLst/>
+          </a:prstGeom>
+          <a:ln w="19050">
+            <a:solidFill>
+              <a:schemeClr val="accent4">
+                <a:lumMod val="60000"/>
+                <a:lumOff val="40000"/>
+              </a:schemeClr>
+            </a:solidFill>
+            <a:prstDash val="sysDash"/>
+            <a:headEnd type="arrow" w="med" len="med"/>
+            <a:tailEnd type="none" w="med" len="med"/>
+          </a:ln>
+        </p:spPr>
+        <p:style>
+          <a:lnRef idx="1">
+            <a:schemeClr val="accent1"/>
+          </a:lnRef>
+          <a:fillRef idx="0">
+            <a:schemeClr val="accent1"/>
+          </a:fillRef>
+          <a:effectRef idx="0">
+            <a:schemeClr val="accent1"/>
+          </a:effectRef>
+          <a:fontRef idx="minor">
+            <a:schemeClr val="tx1"/>
+          </a:fontRef>
+        </p:style>
+      </p:cxnSp>
+      <p:cxnSp>
+        <p:nvCxnSpPr>
+          <p:cNvPr id="77" name="Straight Arrow Connector 76"/>
+          <p:cNvCxnSpPr/>
+          <p:nvPr/>
+        </p:nvCxnSpPr>
+        <p:spPr>
+          <a:xfrm>
+            <a:off x="1815269" y="5661173"/>
+            <a:ext cx="3651369" cy="0"/>
+          </a:xfrm>
+          <a:prstGeom prst="straightConnector1">
+            <a:avLst/>
+          </a:prstGeom>
+          <a:ln w="19050">
+            <a:solidFill>
+              <a:srgbClr val="0070C0"/>
+            </a:solidFill>
+            <a:prstDash val="sysDash"/>
+            <a:headEnd type="arrow" w="med" len="med"/>
+            <a:tailEnd type="none" w="med" len="med"/>
+          </a:ln>
+        </p:spPr>
+        <p:style>
+          <a:lnRef idx="1">
+            <a:schemeClr val="accent1"/>
+          </a:lnRef>
+          <a:fillRef idx="0">
+            <a:schemeClr val="accent1"/>
+          </a:fillRef>
+          <a:effectRef idx="0">
+            <a:schemeClr val="accent1"/>
+          </a:effectRef>
+          <a:fontRef idx="minor">
+            <a:schemeClr val="tx1"/>
+          </a:fontRef>
+        </p:style>
+      </p:cxnSp>
+      <p:sp>
+        <p:nvSpPr>
+          <p:cNvPr id="78" name="TextBox 77"/>
+          <p:cNvSpPr txBox="1"/>
+          <p:nvPr/>
+        </p:nvSpPr>
+        <p:spPr>
+          <a:xfrm>
+            <a:off x="6858000" y="4278848"/>
+            <a:ext cx="1424846" cy="215444"/>
+          </a:xfrm>
+          <a:prstGeom prst="rect">
+            <a:avLst/>
+          </a:prstGeom>
+          <a:noFill/>
+        </p:spPr>
+        <p:txBody>
+          <a:bodyPr wrap="square" lIns="0" tIns="0" rIns="0" bIns="0" rtlCol="0">
+            <a:spAutoFit/>
+          </a:bodyPr>
+          <a:lstStyle>
+            <a:defPPr>
+              <a:defRPr lang="en-US"/>
+            </a:defPPr>
+            <a:lvl1pPr algn="r">
+              <a:defRPr sz="1400">
+                <a:solidFill>
+                  <a:srgbClr val="0070C0"/>
+                </a:solidFill>
+              </a:defRPr>
+            </a:lvl1pPr>
+          </a:lstStyle>
+          <a:p>
+            <a:r>
+              <a:rPr lang="en-US" dirty="0" err="1" smtClean="0">
+                <a:solidFill>
+                  <a:srgbClr val="7030A0"/>
+                </a:solidFill>
+              </a:rPr>
+              <a:t>deletePerson</a:t>
+            </a:r>
+            <a:r>
+              <a:rPr lang="en-US" dirty="0" smtClean="0">
+                <a:solidFill>
+                  <a:srgbClr val="7030A0"/>
+                </a:solidFill>
+              </a:rPr>
+              <a:t>(p)</a:t>
+            </a:r>
+            <a:endParaRPr lang="en-US" dirty="0">
+              <a:solidFill>
+                <a:srgbClr val="7030A0"/>
+              </a:solidFill>
+            </a:endParaRPr>
+          </a:p>
+        </p:txBody>
+      </p:sp>
+      <p:sp>
+        <p:nvSpPr>
+          <p:cNvPr id="79" name="TextBox 78"/>
+          <p:cNvSpPr txBox="1"/>
+          <p:nvPr/>
+        </p:nvSpPr>
+        <p:spPr>
+          <a:xfrm>
+            <a:off x="4191000" y="2996259"/>
+            <a:ext cx="640023" cy="215444"/>
+          </a:xfrm>
+          <a:prstGeom prst="rect">
+            <a:avLst/>
+          </a:prstGeom>
+          <a:noFill/>
+        </p:spPr>
+        <p:txBody>
+          <a:bodyPr wrap="square" lIns="0" tIns="0" rIns="0" bIns="0" rtlCol="0">
+            <a:spAutoFit/>
+          </a:bodyPr>
+          <a:lstStyle>
+            <a:defPPr>
+              <a:defRPr lang="en-US"/>
+            </a:defPPr>
+            <a:lvl1pPr algn="r">
+              <a:defRPr sz="1400">
+                <a:solidFill>
+                  <a:srgbClr val="0070C0"/>
+                </a:solidFill>
+              </a:defRPr>
+            </a:lvl1pPr>
+          </a:lstStyle>
+          <a:p>
+            <a:r>
+              <a:rPr lang="en-US" dirty="0" smtClean="0"/>
+              <a:t>create()</a:t>
+            </a:r>
+            <a:endParaRPr lang="en-US" dirty="0"/>
+          </a:p>
+        </p:txBody>
+      </p:sp>
+      <p:sp>
+        <p:nvSpPr>
+          <p:cNvPr id="80" name="TextBox 79"/>
+          <p:cNvSpPr txBox="1"/>
+          <p:nvPr/>
+        </p:nvSpPr>
+        <p:spPr>
+          <a:xfrm>
+            <a:off x="2131905" y="2850922"/>
+            <a:ext cx="1424846" cy="215444"/>
+          </a:xfrm>
+          <a:prstGeom prst="rect">
+            <a:avLst/>
+          </a:prstGeom>
+          <a:noFill/>
+        </p:spPr>
+        <p:txBody>
+          <a:bodyPr wrap="square" lIns="0" tIns="0" rIns="0" bIns="0" rtlCol="0">
+            <a:spAutoFit/>
+          </a:bodyPr>
+          <a:lstStyle>
+            <a:defPPr>
+              <a:defRPr lang="en-US"/>
+            </a:defPPr>
+            <a:lvl1pPr algn="r">
+              <a:defRPr sz="1400">
+                <a:solidFill>
+                  <a:srgbClr val="0070C0"/>
+                </a:solidFill>
+              </a:defRPr>
+            </a:lvl1pPr>
+          </a:lstStyle>
+          <a:p>
+            <a:r>
+              <a:rPr lang="en-US" dirty="0" smtClean="0"/>
+              <a:t>parse(“delete 1”)</a:t>
+            </a:r>
+            <a:endParaRPr lang="en-US" dirty="0"/>
+          </a:p>
+        </p:txBody>
+      </p:sp>
+      <p:sp>
+        <p:nvSpPr>
+          <p:cNvPr id="82" name="TextBox 81"/>
+          <p:cNvSpPr txBox="1"/>
+          <p:nvPr/>
+        </p:nvSpPr>
+        <p:spPr>
+          <a:xfrm>
+            <a:off x="3101175" y="5430096"/>
+            <a:ext cx="621216" cy="215444"/>
+          </a:xfrm>
+          <a:prstGeom prst="rect">
+            <a:avLst/>
+          </a:prstGeom>
+          <a:noFill/>
+        </p:spPr>
+        <p:txBody>
+          <a:bodyPr wrap="square" lIns="0" tIns="0" rIns="0" bIns="0" rtlCol="0">
+            <a:spAutoFit/>
+          </a:bodyPr>
+          <a:lstStyle>
+            <a:defPPr>
+              <a:defRPr lang="en-US"/>
+            </a:defPPr>
+            <a:lvl1pPr algn="r">
+              <a:defRPr sz="1400">
+                <a:solidFill>
+                  <a:srgbClr val="0070C0"/>
+                </a:solidFill>
+              </a:defRPr>
+            </a:lvl1pPr>
+          </a:lstStyle>
+          <a:p>
+            <a:r>
+              <a:rPr lang="en-US" dirty="0" smtClean="0"/>
+              <a:t>result</a:t>
+            </a:r>
+            <a:endParaRPr lang="en-US" dirty="0"/>
+          </a:p>
+        </p:txBody>
+      </p:sp>
+      <p:sp>
+        <p:nvSpPr>
+          <p:cNvPr id="83" name="TextBox 82"/>
+          <p:cNvSpPr txBox="1"/>
+          <p:nvPr/>
+        </p:nvSpPr>
+        <p:spPr>
+          <a:xfrm>
+            <a:off x="762001" y="5538488"/>
+            <a:ext cx="762000" cy="215444"/>
+          </a:xfrm>
+          <a:prstGeom prst="rect">
+            <a:avLst/>
+          </a:prstGeom>
+          <a:noFill/>
+        </p:spPr>
+        <p:txBody>
+          <a:bodyPr wrap="square" lIns="0" tIns="0" rIns="0" bIns="0" rtlCol="0">
+            <a:spAutoFit/>
+          </a:bodyPr>
+          <a:lstStyle>
+            <a:defPPr>
+              <a:defRPr lang="en-US"/>
+            </a:defPPr>
+            <a:lvl1pPr algn="r">
+              <a:defRPr sz="1400">
+                <a:solidFill>
+                  <a:srgbClr val="0070C0"/>
+                </a:solidFill>
+              </a:defRPr>
+            </a:lvl1pPr>
+          </a:lstStyle>
+          <a:p>
+            <a:r>
+              <a:rPr lang="en-US" dirty="0" smtClean="0"/>
+              <a:t>result</a:t>
+            </a:r>
+            <a:endParaRPr lang="en-US" dirty="0"/>
+          </a:p>
+        </p:txBody>
+      </p:sp>
+      <p:sp>
+        <p:nvSpPr>
+          <p:cNvPr id="84" name="Rectangle 62"/>
+          <p:cNvSpPr/>
+          <p:nvPr/>
+        </p:nvSpPr>
+        <p:spPr>
+          <a:xfrm>
+            <a:off x="6029646" y="4953000"/>
+            <a:ext cx="1666554" cy="461538"/>
+          </a:xfrm>
+          <a:prstGeom prst="rect">
+            <a:avLst/>
+          </a:prstGeom>
+          <a:solidFill>
+            <a:srgbClr val="0070C0"/>
+          </a:solidFill>
+          <a:ln w="19050">
+            <a:solidFill>
+              <a:srgbClr val="0070C0"/>
+            </a:solidFill>
+          </a:ln>
+          <a:effectLst/>
+        </p:spPr>
+        <p:style>
+          <a:lnRef idx="1">
+            <a:schemeClr val="accent2"/>
+          </a:lnRef>
+          <a:fillRef idx="2">
+            <a:schemeClr val="accent2"/>
+          </a:fillRef>
+          <a:effectRef idx="1">
+            <a:schemeClr val="accent2"/>
+          </a:effectRef>
+          <a:fontRef idx="minor">
+            <a:schemeClr val="dk1"/>
+          </a:fontRef>
+        </p:style>
+        <p:txBody>
+          <a:bodyPr rtlCol="0" anchor="ctr"/>
+          <a:lstStyle/>
+          <a:p>
+            <a:pPr algn="ctr"/>
+            <a:r>
+              <a:rPr lang="en-US" sz="1600" dirty="0" smtClean="0">
+                <a:solidFill>
+                  <a:schemeClr val="bg1"/>
+                </a:solidFill>
+              </a:rPr>
+              <a:t>result:</a:t>
+            </a:r>
+            <a:br>
+              <a:rPr lang="en-US" sz="1600" dirty="0" smtClean="0">
+                <a:solidFill>
+                  <a:schemeClr val="bg1"/>
+                </a:solidFill>
+              </a:rPr>
+            </a:br>
+            <a:r>
+              <a:rPr lang="en-US" sz="1600" dirty="0" err="1" smtClean="0">
+                <a:solidFill>
+                  <a:schemeClr val="bg1"/>
+                </a:solidFill>
+              </a:rPr>
+              <a:t>CommandResult</a:t>
+            </a:r>
+            <a:endParaRPr lang="en-SG" sz="1600" dirty="0">
+              <a:solidFill>
+                <a:schemeClr val="bg1"/>
+              </a:solidFill>
+            </a:endParaRPr>
+          </a:p>
+        </p:txBody>
+      </p:sp>
+      <p:sp>
+        <p:nvSpPr>
+          <p:cNvPr id="86" name="Rectangle 85"/>
+          <p:cNvSpPr/>
+          <p:nvPr/>
+        </p:nvSpPr>
+        <p:spPr>
+          <a:xfrm>
+            <a:off x="6786723" y="5414538"/>
+            <a:ext cx="152400" cy="171376"/>
+          </a:xfrm>
+          <a:prstGeom prst="rect">
+            <a:avLst/>
+          </a:prstGeom>
+          <a:solidFill>
+            <a:srgbClr val="0070C0"/>
+          </a:solidFill>
+          <a:ln>
+            <a:solidFill>
+              <a:srgbClr val="0070C0"/>
+            </a:solidFill>
+          </a:ln>
+          <a:effectLst/>
+        </p:spPr>
+        <p:style>
+          <a:lnRef idx="1">
+            <a:schemeClr val="accent3"/>
+          </a:lnRef>
+          <a:fillRef idx="2">
+            <a:schemeClr val="accent3"/>
+          </a:fillRef>
+          <a:effectRef idx="1">
+            <a:schemeClr val="accent3"/>
+          </a:effectRef>
+          <a:fontRef idx="minor">
+            <a:schemeClr val="dk1"/>
+          </a:fontRef>
+        </p:style>
+        <p:txBody>
+          <a:bodyPr rtlCol="0" anchor="ctr"/>
+          <a:lstStyle/>
+          <a:p>
+            <a:pPr algn="ctr"/>
+            <a:endParaRPr lang="en-SG" sz="1400"/>
+          </a:p>
+        </p:txBody>
+      </p:sp>
+      <p:cxnSp>
+        <p:nvCxnSpPr>
+          <p:cNvPr id="87" name="Straight Arrow Connector 86"/>
+          <p:cNvCxnSpPr/>
+          <p:nvPr/>
+        </p:nvCxnSpPr>
+        <p:spPr>
+          <a:xfrm>
+            <a:off x="5580209" y="5165675"/>
+            <a:ext cx="447975" cy="0"/>
+          </a:xfrm>
+          <a:prstGeom prst="straightConnector1">
+            <a:avLst/>
+          </a:prstGeom>
+          <a:ln w="19050">
+            <a:solidFill>
+              <a:srgbClr val="0070C0"/>
+            </a:solidFill>
+            <a:tailEnd type="arrow"/>
+          </a:ln>
+        </p:spPr>
+        <p:style>
+          <a:lnRef idx="1">
+            <a:schemeClr val="accent1"/>
+          </a:lnRef>
+          <a:fillRef idx="0">
+            <a:schemeClr val="accent1"/>
+          </a:fillRef>
+          <a:effectRef idx="0">
+            <a:schemeClr val="accent1"/>
+          </a:effectRef>
+          <a:fontRef idx="minor">
+            <a:schemeClr val="tx1"/>
+          </a:fontRef>
+        </p:style>
+      </p:cxnSp>
+      <p:cxnSp>
+        <p:nvCxnSpPr>
+          <p:cNvPr id="90" name="Straight Arrow Connector 89"/>
+          <p:cNvCxnSpPr/>
+          <p:nvPr/>
+        </p:nvCxnSpPr>
+        <p:spPr>
+          <a:xfrm>
+            <a:off x="5580209" y="5585914"/>
+            <a:ext cx="1253815" cy="0"/>
+          </a:xfrm>
+          <a:prstGeom prst="straightConnector1">
+            <a:avLst/>
+          </a:prstGeom>
+          <a:ln w="19050">
+            <a:solidFill>
+              <a:srgbClr val="0070C0"/>
+            </a:solidFill>
+            <a:prstDash val="sysDash"/>
+            <a:headEnd type="arrow" w="med" len="med"/>
+            <a:tailEnd type="none" w="med" len="med"/>
+          </a:ln>
+        </p:spPr>
+        <p:style>
+          <a:lnRef idx="1">
+            <a:schemeClr val="accent1"/>
+          </a:lnRef>
+          <a:fillRef idx="0">
+            <a:schemeClr val="accent1"/>
+          </a:fillRef>
+          <a:effectRef idx="0">
+            <a:schemeClr val="accent1"/>
+          </a:effectRef>
+          <a:fontRef idx="minor">
+            <a:schemeClr val="tx1"/>
+          </a:fontRef>
+        </p:style>
+      </p:cxnSp>
+      <p:sp>
+        <p:nvSpPr>
+          <p:cNvPr id="93" name="TextBox 92"/>
+          <p:cNvSpPr txBox="1"/>
+          <p:nvPr/>
+        </p:nvSpPr>
+        <p:spPr>
+          <a:xfrm>
+            <a:off x="2818928" y="3733800"/>
+            <a:ext cx="220343" cy="215444"/>
+          </a:xfrm>
+          <a:prstGeom prst="rect">
+            <a:avLst/>
+          </a:prstGeom>
+          <a:noFill/>
+        </p:spPr>
+        <p:txBody>
+          <a:bodyPr wrap="square" lIns="0" tIns="0" rIns="0" bIns="0" rtlCol="0">
+            <a:spAutoFit/>
+          </a:bodyPr>
+          <a:lstStyle>
+            <a:defPPr>
+              <a:defRPr lang="en-US"/>
+            </a:defPPr>
+            <a:lvl1pPr algn="r">
+              <a:defRPr sz="1400">
+                <a:solidFill>
+                  <a:srgbClr val="0070C0"/>
+                </a:solidFill>
+              </a:defRPr>
+            </a:lvl1pPr>
+          </a:lstStyle>
+          <a:p>
+            <a:r>
+              <a:rPr lang="en-US" dirty="0" smtClean="0"/>
+              <a:t>d</a:t>
+            </a:r>
+            <a:endParaRPr lang="en-US" dirty="0"/>
+          </a:p>
+        </p:txBody>
+      </p:sp>
+    </p:spTree>
+    <p:extLst>
+      <p:ext uri="{BB962C8B-B14F-4D97-AF65-F5344CB8AC3E}">
+        <p14:creationId xmlns:p14="http://schemas.microsoft.com/office/powerpoint/2010/main" val="3945898909"/>
+      </p:ext>
+    </p:extLst>
+  </p:cSld>
+  <p:clrMapOvr>
+    <a:masterClrMapping/>
+  </p:clrMapOvr>
+</p:sld>
+</file>
+
+<file path=ppt/slides/slide7.xml><?xml version="1.0" encoding="utf-8"?>
+<p:sld xmlns:a="http://schemas.openxmlformats.org/drawingml/2006/main" xmlns:r="http://schemas.openxmlformats.org/officeDocument/2006/relationships" xmlns:p="http://schemas.openxmlformats.org/presentationml/2006/main">
+  <p:cSld>
+    <p:spTree>
+      <p:nvGrpSpPr>
+        <p:cNvPr id="1" name=""/>
+        <p:cNvGrpSpPr/>
+        <p:nvPr/>
+      </p:nvGrpSpPr>
+      <p:grpSpPr>
+        <a:xfrm>
+          <a:off x="0" y="0"/>
+          <a:ext cx="0" cy="0"/>
+          <a:chOff x="0" y="0"/>
+          <a:chExt cx="0" cy="0"/>
+        </a:xfrm>
+      </p:grpSpPr>
+      <p:sp>
+        <p:nvSpPr>
           <p:cNvPr id="118" name="Rectangle 65"/>
           <p:cNvSpPr/>
           <p:nvPr/>
@@ -13730,7 +15407,7 @@
 </p:sld>
 </file>
 
-<file path=ppt/slides/slide7.xml><?xml version="1.0" encoding="utf-8"?>
+<file path=ppt/slides/slide8.xml><?xml version="1.0" encoding="utf-8"?>
 <p:sld xmlns:a="http://schemas.openxmlformats.org/drawingml/2006/main" xmlns:r="http://schemas.openxmlformats.org/officeDocument/2006/relationships" xmlns:p="http://schemas.openxmlformats.org/presentationml/2006/main">
   <p:cSld>
     <p:spTree>
@@ -15152,7 +16829,7 @@
 </p:sld>
 </file>
 
-<file path=ppt/slides/slide8.xml><?xml version="1.0" encoding="utf-8"?>
+<file path=ppt/slides/slide9.xml><?xml version="1.0" encoding="utf-8"?>
 <p:sld xmlns:a="http://schemas.openxmlformats.org/drawingml/2006/main" xmlns:r="http://schemas.openxmlformats.org/officeDocument/2006/relationships" xmlns:p="http://schemas.openxmlformats.org/presentationml/2006/main">
   <p:cSld>
     <p:spTree>

</xml_diff>

<commit_message>
[138] User can add email, address, tags in any order
</commit_message>
<xml_diff>
--- a/docs/diagrams/Diagrams.pptx
+++ b/docs/diagrams/Diagrams.pptx
@@ -200,7 +200,7 @@
           <a:p>
             <a:fld id="{F5CC4B3F-88C1-4FFA-B1B6-F41C21DC6924}" type="datetimeFigureOut">
               <a:rPr lang="en-US" smtClean="0"/>
-              <a:t>9/30/2016</a:t>
+              <a:t>10/15/2016</a:t>
             </a:fld>
             <a:endParaRPr lang="en-US"/>
           </a:p>
@@ -649,7 +649,7 @@
           <a:p>
             <a:fld id="{78C97017-6FC3-485B-9764-EAC9E56C1D49}" type="datetimeFigureOut">
               <a:rPr lang="en-US" smtClean="0"/>
-              <a:t>9/30/2016</a:t>
+              <a:t>10/15/2016</a:t>
             </a:fld>
             <a:endParaRPr lang="en-US"/>
           </a:p>
@@ -819,7 +819,7 @@
           <a:p>
             <a:fld id="{78C97017-6FC3-485B-9764-EAC9E56C1D49}" type="datetimeFigureOut">
               <a:rPr lang="en-US" smtClean="0"/>
-              <a:t>9/30/2016</a:t>
+              <a:t>10/15/2016</a:t>
             </a:fld>
             <a:endParaRPr lang="en-US"/>
           </a:p>
@@ -999,7 +999,7 @@
           <a:p>
             <a:fld id="{78C97017-6FC3-485B-9764-EAC9E56C1D49}" type="datetimeFigureOut">
               <a:rPr lang="en-US" smtClean="0"/>
-              <a:t>9/30/2016</a:t>
+              <a:t>10/15/2016</a:t>
             </a:fld>
             <a:endParaRPr lang="en-US"/>
           </a:p>
@@ -1169,7 +1169,7 @@
           <a:p>
             <a:fld id="{78C97017-6FC3-485B-9764-EAC9E56C1D49}" type="datetimeFigureOut">
               <a:rPr lang="en-US" smtClean="0"/>
-              <a:t>9/30/2016</a:t>
+              <a:t>10/15/2016</a:t>
             </a:fld>
             <a:endParaRPr lang="en-US"/>
           </a:p>
@@ -1415,7 +1415,7 @@
           <a:p>
             <a:fld id="{78C97017-6FC3-485B-9764-EAC9E56C1D49}" type="datetimeFigureOut">
               <a:rPr lang="en-US" smtClean="0"/>
-              <a:t>9/30/2016</a:t>
+              <a:t>10/15/2016</a:t>
             </a:fld>
             <a:endParaRPr lang="en-US"/>
           </a:p>
@@ -1703,7 +1703,7 @@
           <a:p>
             <a:fld id="{78C97017-6FC3-485B-9764-EAC9E56C1D49}" type="datetimeFigureOut">
               <a:rPr lang="en-US" smtClean="0"/>
-              <a:t>9/30/2016</a:t>
+              <a:t>10/15/2016</a:t>
             </a:fld>
             <a:endParaRPr lang="en-US"/>
           </a:p>
@@ -2125,7 +2125,7 @@
           <a:p>
             <a:fld id="{78C97017-6FC3-485B-9764-EAC9E56C1D49}" type="datetimeFigureOut">
               <a:rPr lang="en-US" smtClean="0"/>
-              <a:t>9/30/2016</a:t>
+              <a:t>10/15/2016</a:t>
             </a:fld>
             <a:endParaRPr lang="en-US"/>
           </a:p>
@@ -2243,7 +2243,7 @@
           <a:p>
             <a:fld id="{78C97017-6FC3-485B-9764-EAC9E56C1D49}" type="datetimeFigureOut">
               <a:rPr lang="en-US" smtClean="0"/>
-              <a:t>9/30/2016</a:t>
+              <a:t>10/15/2016</a:t>
             </a:fld>
             <a:endParaRPr lang="en-US"/>
           </a:p>
@@ -2338,7 +2338,7 @@
           <a:p>
             <a:fld id="{78C97017-6FC3-485B-9764-EAC9E56C1D49}" type="datetimeFigureOut">
               <a:rPr lang="en-US" smtClean="0"/>
-              <a:t>9/30/2016</a:t>
+              <a:t>10/15/2016</a:t>
             </a:fld>
             <a:endParaRPr lang="en-US"/>
           </a:p>
@@ -2615,7 +2615,7 @@
           <a:p>
             <a:fld id="{78C97017-6FC3-485B-9764-EAC9E56C1D49}" type="datetimeFigureOut">
               <a:rPr lang="en-US" smtClean="0"/>
-              <a:t>9/30/2016</a:t>
+              <a:t>10/15/2016</a:t>
             </a:fld>
             <a:endParaRPr lang="en-US"/>
           </a:p>
@@ -2868,7 +2868,7 @@
           <a:p>
             <a:fld id="{78C97017-6FC3-485B-9764-EAC9E56C1D49}" type="datetimeFigureOut">
               <a:rPr lang="en-US" smtClean="0"/>
-              <a:t>9/30/2016</a:t>
+              <a:t>10/15/2016</a:t>
             </a:fld>
             <a:endParaRPr lang="en-US"/>
           </a:p>
@@ -3081,7 +3081,7 @@
           <a:p>
             <a:fld id="{78C97017-6FC3-485B-9764-EAC9E56C1D49}" type="datetimeFigureOut">
               <a:rPr lang="en-US" smtClean="0"/>
-              <a:t>9/30/2016</a:t>
+              <a:t>10/15/2016</a:t>
             </a:fld>
             <a:endParaRPr lang="en-US"/>
           </a:p>
@@ -10972,7 +10972,7 @@
           </a:xfrm>
           <a:prstGeom prst="bentConnector3">
             <a:avLst>
-              <a:gd name="adj1" fmla="val -10880533"/>
+              <a:gd name="adj1" fmla="val -31982199"/>
             </a:avLst>
           </a:prstGeom>
           <a:ln w="19050">
@@ -11008,7 +11008,7 @@
         </p:nvGrpSpPr>
         <p:grpSpPr>
           <a:xfrm>
-            <a:off x="4064583" y="3334635"/>
+            <a:off x="4107656" y="2869489"/>
             <a:ext cx="889000" cy="230832"/>
             <a:chOff x="2895600" y="807932"/>
             <a:chExt cx="889000" cy="230832"/>
@@ -11532,6 +11532,259 @@
           </a:fontRef>
         </p:style>
       </p:cxnSp>
+      <p:sp>
+        <p:nvSpPr>
+          <p:cNvPr id="47" name="Rectangle 62"/>
+          <p:cNvSpPr/>
+          <p:nvPr/>
+        </p:nvSpPr>
+        <p:spPr>
+          <a:xfrm>
+            <a:off x="3048000" y="3183650"/>
+            <a:ext cx="751107" cy="346760"/>
+          </a:xfrm>
+          <a:prstGeom prst="rect">
+            <a:avLst/>
+          </a:prstGeom>
+          <a:solidFill>
+            <a:srgbClr val="0070C0"/>
+          </a:solidFill>
+          <a:ln w="19050">
+            <a:solidFill>
+              <a:srgbClr val="0070C0"/>
+            </a:solidFill>
+          </a:ln>
+          <a:effectLst/>
+        </p:spPr>
+        <p:style>
+          <a:lnRef idx="1">
+            <a:schemeClr val="accent2"/>
+          </a:lnRef>
+          <a:fillRef idx="2">
+            <a:schemeClr val="accent2"/>
+          </a:fillRef>
+          <a:effectRef idx="1">
+            <a:schemeClr val="accent2"/>
+          </a:effectRef>
+          <a:fontRef idx="minor">
+            <a:schemeClr val="dk1"/>
+          </a:fontRef>
+        </p:style>
+        <p:txBody>
+          <a:bodyPr rtlCol="0" anchor="ctr"/>
+          <a:lstStyle/>
+          <a:p>
+            <a:pPr algn="ctr"/>
+            <a:r>
+              <a:rPr lang="en-US" sz="1050" dirty="0" smtClean="0">
+                <a:solidFill>
+                  <a:schemeClr val="bg1"/>
+                </a:solidFill>
+              </a:rPr>
+              <a:t>Argument</a:t>
+            </a:r>
+            <a:br>
+              <a:rPr lang="en-US" sz="1050" dirty="0" smtClean="0">
+                <a:solidFill>
+                  <a:schemeClr val="bg1"/>
+                </a:solidFill>
+              </a:rPr>
+            </a:br>
+            <a:r>
+              <a:rPr lang="en-US" sz="1050" dirty="0" smtClean="0">
+                <a:solidFill>
+                  <a:schemeClr val="bg1"/>
+                </a:solidFill>
+              </a:rPr>
+              <a:t>Tokenizer</a:t>
+            </a:r>
+            <a:endParaRPr lang="en-SG" sz="1050" dirty="0">
+              <a:solidFill>
+                <a:schemeClr val="bg1"/>
+              </a:solidFill>
+            </a:endParaRPr>
+          </a:p>
+        </p:txBody>
+      </p:sp>
+      <p:cxnSp>
+        <p:nvCxnSpPr>
+          <p:cNvPr id="48" name="Straight Arrow Connector 110"/>
+          <p:cNvCxnSpPr/>
+          <p:nvPr/>
+        </p:nvCxnSpPr>
+        <p:spPr>
+          <a:xfrm flipV="1">
+            <a:off x="3581400" y="3511872"/>
+            <a:ext cx="0" cy="245052"/>
+          </a:xfrm>
+          <a:prstGeom prst="straightConnector1">
+            <a:avLst/>
+          </a:prstGeom>
+          <a:ln w="19050">
+            <a:solidFill>
+              <a:srgbClr val="0070C0"/>
+            </a:solidFill>
+            <a:prstDash val="sysDot"/>
+            <a:headEnd type="none" w="med" len="med"/>
+            <a:tailEnd type="arrow" w="med" len="med"/>
+          </a:ln>
+          <a:effectLst/>
+        </p:spPr>
+        <p:style>
+          <a:lnRef idx="1">
+            <a:schemeClr val="accent2"/>
+          </a:lnRef>
+          <a:fillRef idx="2">
+            <a:schemeClr val="accent2"/>
+          </a:fillRef>
+          <a:effectRef idx="1">
+            <a:schemeClr val="accent2"/>
+          </a:effectRef>
+          <a:fontRef idx="minor">
+            <a:schemeClr val="dk1"/>
+          </a:fontRef>
+        </p:style>
+      </p:cxnSp>
+      <p:sp>
+        <p:nvSpPr>
+          <p:cNvPr id="49" name="Rectangle 62"/>
+          <p:cNvSpPr/>
+          <p:nvPr/>
+        </p:nvSpPr>
+        <p:spPr>
+          <a:xfrm>
+            <a:off x="3990437" y="3188061"/>
+            <a:ext cx="510397" cy="346760"/>
+          </a:xfrm>
+          <a:prstGeom prst="rect">
+            <a:avLst/>
+          </a:prstGeom>
+          <a:solidFill>
+            <a:srgbClr val="0070C0"/>
+          </a:solidFill>
+          <a:ln w="19050">
+            <a:solidFill>
+              <a:srgbClr val="0070C0"/>
+            </a:solidFill>
+          </a:ln>
+          <a:effectLst/>
+        </p:spPr>
+        <p:style>
+          <a:lnRef idx="1">
+            <a:schemeClr val="accent2"/>
+          </a:lnRef>
+          <a:fillRef idx="2">
+            <a:schemeClr val="accent2"/>
+          </a:fillRef>
+          <a:effectRef idx="1">
+            <a:schemeClr val="accent2"/>
+          </a:effectRef>
+          <a:fontRef idx="minor">
+            <a:schemeClr val="dk1"/>
+          </a:fontRef>
+        </p:style>
+        <p:txBody>
+          <a:bodyPr rtlCol="0" anchor="ctr"/>
+          <a:lstStyle/>
+          <a:p>
+            <a:pPr algn="ctr"/>
+            <a:r>
+              <a:rPr lang="en-US" sz="1050" dirty="0" smtClean="0">
+                <a:solidFill>
+                  <a:schemeClr val="bg1"/>
+                </a:solidFill>
+              </a:rPr>
+              <a:t>Prefix</a:t>
+            </a:r>
+            <a:endParaRPr lang="en-SG" sz="1050" dirty="0">
+              <a:solidFill>
+                <a:schemeClr val="bg1"/>
+              </a:solidFill>
+            </a:endParaRPr>
+          </a:p>
+        </p:txBody>
+      </p:sp>
+      <p:cxnSp>
+        <p:nvCxnSpPr>
+          <p:cNvPr id="50" name="Straight Arrow Connector 110"/>
+          <p:cNvCxnSpPr>
+            <a:stCxn id="47" idx="3"/>
+            <a:endCxn id="49" idx="1"/>
+          </p:cNvCxnSpPr>
+          <p:nvPr/>
+        </p:nvCxnSpPr>
+        <p:spPr>
+          <a:xfrm>
+            <a:off x="3799107" y="3357030"/>
+            <a:ext cx="191330" cy="4411"/>
+          </a:xfrm>
+          <a:prstGeom prst="straightConnector1">
+            <a:avLst/>
+          </a:prstGeom>
+          <a:ln w="19050">
+            <a:solidFill>
+              <a:srgbClr val="0070C0"/>
+            </a:solidFill>
+            <a:prstDash val="sysDot"/>
+            <a:headEnd type="none" w="med" len="med"/>
+            <a:tailEnd type="arrow" w="med" len="med"/>
+          </a:ln>
+          <a:effectLst/>
+        </p:spPr>
+        <p:style>
+          <a:lnRef idx="1">
+            <a:schemeClr val="accent2"/>
+          </a:lnRef>
+          <a:fillRef idx="2">
+            <a:schemeClr val="accent2"/>
+          </a:fillRef>
+          <a:effectRef idx="1">
+            <a:schemeClr val="accent2"/>
+          </a:effectRef>
+          <a:fontRef idx="minor">
+            <a:schemeClr val="dk1"/>
+          </a:fontRef>
+        </p:style>
+      </p:cxnSp>
+      <p:cxnSp>
+        <p:nvCxnSpPr>
+          <p:cNvPr id="52" name="Straight Arrow Connector 110"/>
+          <p:cNvCxnSpPr/>
+          <p:nvPr/>
+        </p:nvCxnSpPr>
+        <p:spPr>
+          <a:xfrm flipV="1">
+            <a:off x="4049717" y="3530410"/>
+            <a:ext cx="0" cy="245052"/>
+          </a:xfrm>
+          <a:prstGeom prst="straightConnector1">
+            <a:avLst/>
+          </a:prstGeom>
+          <a:ln w="19050">
+            <a:solidFill>
+              <a:srgbClr val="0070C0"/>
+            </a:solidFill>
+            <a:prstDash val="sysDot"/>
+            <a:headEnd type="none" w="med" len="med"/>
+            <a:tailEnd type="arrow" w="med" len="med"/>
+          </a:ln>
+          <a:effectLst/>
+        </p:spPr>
+        <p:style>
+          <a:lnRef idx="1">
+            <a:schemeClr val="accent2"/>
+          </a:lnRef>
+          <a:fillRef idx="2">
+            <a:schemeClr val="accent2"/>
+          </a:fillRef>
+          <a:effectRef idx="1">
+            <a:schemeClr val="accent2"/>
+          </a:effectRef>
+          <a:fontRef idx="minor">
+            <a:schemeClr val="dk1"/>
+          </a:fontRef>
+        </p:style>
+      </p:cxnSp>
     </p:spTree>
     <p:extLst>
       <p:ext uri="{BB962C8B-B14F-4D97-AF65-F5344CB8AC3E}">
@@ -12280,7 +12533,6 @@
               <a:rPr lang="en-US" dirty="0"/>
               <a:t>execute()</a:t>
             </a:r>
-            <a:endParaRPr lang="en-US" dirty="0"/>
           </a:p>
         </p:txBody>
       </p:sp>

</xml_diff>